<commit_message>
Add the LinkedHashMap into pptx
</commit_message>
<xml_diff>
--- a/JavaStudy/JavaStudyNote/Collection-Map/Java_Map.pptx
+++ b/JavaStudy/JavaStudyNote/Collection-Map/Java_Map.pptx
@@ -7,6 +7,7 @@
   <p:sldIdLst>
     <p:sldId id="256" r:id="rId2"/>
     <p:sldId id="257" r:id="rId3"/>
+    <p:sldId id="258" r:id="rId4"/>
   </p:sldIdLst>
   <p:sldSz cx="12192000" cy="6858000"/>
   <p:notesSz cx="6858000" cy="9144000"/>
@@ -105,6 +106,11 @@
       </a:defRPr>
     </a:lvl9pPr>
   </p:defaultTextStyle>
+  <p:extLst>
+    <p:ext uri="{EFAFB233-063F-42B5-8137-9DF3F51BA10A}">
+      <p15:sldGuideLst xmlns:p15="http://schemas.microsoft.com/office/powerpoint/2012/main"/>
+    </p:ext>
+  </p:extLst>
 </p:presentation>
 </file>
 
@@ -255,7 +261,7 @@
           <a:p>
             <a:fld id="{3AEC4CB6-210D-441B-A112-5009B0B7ACC5}" type="datetimeFigureOut">
               <a:rPr lang="zh-TW" altLang="en-US" smtClean="0"/>
-              <a:t>2023/2/7</a:t>
+              <a:t>2023/2/10</a:t>
             </a:fld>
             <a:endParaRPr lang="zh-TW" altLang="en-US"/>
           </a:p>
@@ -453,7 +459,7 @@
           <a:p>
             <a:fld id="{3AEC4CB6-210D-441B-A112-5009B0B7ACC5}" type="datetimeFigureOut">
               <a:rPr lang="zh-TW" altLang="en-US" smtClean="0"/>
-              <a:t>2023/2/7</a:t>
+              <a:t>2023/2/10</a:t>
             </a:fld>
             <a:endParaRPr lang="zh-TW" altLang="en-US"/>
           </a:p>
@@ -661,7 +667,7 @@
           <a:p>
             <a:fld id="{3AEC4CB6-210D-441B-A112-5009B0B7ACC5}" type="datetimeFigureOut">
               <a:rPr lang="zh-TW" altLang="en-US" smtClean="0"/>
-              <a:t>2023/2/7</a:t>
+              <a:t>2023/2/10</a:t>
             </a:fld>
             <a:endParaRPr lang="zh-TW" altLang="en-US"/>
           </a:p>
@@ -859,7 +865,7 @@
           <a:p>
             <a:fld id="{3AEC4CB6-210D-441B-A112-5009B0B7ACC5}" type="datetimeFigureOut">
               <a:rPr lang="zh-TW" altLang="en-US" smtClean="0"/>
-              <a:t>2023/2/7</a:t>
+              <a:t>2023/2/10</a:t>
             </a:fld>
             <a:endParaRPr lang="zh-TW" altLang="en-US"/>
           </a:p>
@@ -1134,7 +1140,7 @@
           <a:p>
             <a:fld id="{3AEC4CB6-210D-441B-A112-5009B0B7ACC5}" type="datetimeFigureOut">
               <a:rPr lang="zh-TW" altLang="en-US" smtClean="0"/>
-              <a:t>2023/2/7</a:t>
+              <a:t>2023/2/10</a:t>
             </a:fld>
             <a:endParaRPr lang="zh-TW" altLang="en-US"/>
           </a:p>
@@ -1399,7 +1405,7 @@
           <a:p>
             <a:fld id="{3AEC4CB6-210D-441B-A112-5009B0B7ACC5}" type="datetimeFigureOut">
               <a:rPr lang="zh-TW" altLang="en-US" smtClean="0"/>
-              <a:t>2023/2/7</a:t>
+              <a:t>2023/2/10</a:t>
             </a:fld>
             <a:endParaRPr lang="zh-TW" altLang="en-US"/>
           </a:p>
@@ -1811,7 +1817,7 @@
           <a:p>
             <a:fld id="{3AEC4CB6-210D-441B-A112-5009B0B7ACC5}" type="datetimeFigureOut">
               <a:rPr lang="zh-TW" altLang="en-US" smtClean="0"/>
-              <a:t>2023/2/7</a:t>
+              <a:t>2023/2/10</a:t>
             </a:fld>
             <a:endParaRPr lang="zh-TW" altLang="en-US"/>
           </a:p>
@@ -1952,7 +1958,7 @@
           <a:p>
             <a:fld id="{3AEC4CB6-210D-441B-A112-5009B0B7ACC5}" type="datetimeFigureOut">
               <a:rPr lang="zh-TW" altLang="en-US" smtClean="0"/>
-              <a:t>2023/2/7</a:t>
+              <a:t>2023/2/10</a:t>
             </a:fld>
             <a:endParaRPr lang="zh-TW" altLang="en-US"/>
           </a:p>
@@ -2065,7 +2071,7 @@
           <a:p>
             <a:fld id="{3AEC4CB6-210D-441B-A112-5009B0B7ACC5}" type="datetimeFigureOut">
               <a:rPr lang="zh-TW" altLang="en-US" smtClean="0"/>
-              <a:t>2023/2/7</a:t>
+              <a:t>2023/2/10</a:t>
             </a:fld>
             <a:endParaRPr lang="zh-TW" altLang="en-US"/>
           </a:p>
@@ -2376,7 +2382,7 @@
           <a:p>
             <a:fld id="{3AEC4CB6-210D-441B-A112-5009B0B7ACC5}" type="datetimeFigureOut">
               <a:rPr lang="zh-TW" altLang="en-US" smtClean="0"/>
-              <a:t>2023/2/7</a:t>
+              <a:t>2023/2/10</a:t>
             </a:fld>
             <a:endParaRPr lang="zh-TW" altLang="en-US"/>
           </a:p>
@@ -2664,7 +2670,7 @@
           <a:p>
             <a:fld id="{3AEC4CB6-210D-441B-A112-5009B0B7ACC5}" type="datetimeFigureOut">
               <a:rPr lang="zh-TW" altLang="en-US" smtClean="0"/>
-              <a:t>2023/2/7</a:t>
+              <a:t>2023/2/10</a:t>
             </a:fld>
             <a:endParaRPr lang="zh-TW" altLang="en-US"/>
           </a:p>
@@ -2905,7 +2911,7 @@
           <a:p>
             <a:fld id="{3AEC4CB6-210D-441B-A112-5009B0B7ACC5}" type="datetimeFigureOut">
               <a:rPr lang="zh-TW" altLang="en-US" smtClean="0"/>
-              <a:t>2023/2/7</a:t>
+              <a:t>2023/2/10</a:t>
             </a:fld>
             <a:endParaRPr lang="zh-TW" altLang="en-US"/>
           </a:p>
@@ -3410,22 +3416,22 @@
           <a:lstStyle/>
           <a:p>
             <a:r>
-              <a:rPr lang="en-US" altLang="zh-CN" dirty="0"/>
+              <a:rPr lang="en-US" altLang="zh-CN" b="1" u="sng" dirty="0"/>
               <a:t>HashMap</a:t>
             </a:r>
             <a:r>
-              <a:rPr lang="zh-CN" altLang="en-US" dirty="0"/>
+              <a:rPr lang="zh-CN" altLang="en-US" b="1" u="sng" dirty="0"/>
               <a:t>和</a:t>
             </a:r>
             <a:r>
-              <a:rPr lang="en-US" altLang="zh-CN" dirty="0" err="1"/>
+              <a:rPr lang="en-US" altLang="zh-CN" b="1" u="sng" dirty="0" err="1"/>
               <a:t>Hashtable</a:t>
             </a:r>
             <a:r>
-              <a:rPr lang="zh-CN" altLang="en-US" dirty="0"/>
+              <a:rPr lang="zh-CN" altLang="en-US" b="1" u="sng" dirty="0"/>
               <a:t>的區別</a:t>
             </a:r>
-            <a:endParaRPr lang="en-US" altLang="zh-CN" dirty="0"/>
+            <a:endParaRPr lang="en-US" altLang="zh-CN" b="1" u="sng" dirty="0"/>
           </a:p>
           <a:p>
             <a:endParaRPr lang="en-US" altLang="zh-CN" dirty="0"/>
@@ -3629,6 +3635,194 @@
     <p:extLst>
       <p:ext uri="{BB962C8B-B14F-4D97-AF65-F5344CB8AC3E}">
         <p14:creationId xmlns:p14="http://schemas.microsoft.com/office/powerpoint/2010/main" val="3834553701"/>
+      </p:ext>
+    </p:extLst>
+  </p:cSld>
+  <p:clrMapOvr>
+    <a:masterClrMapping/>
+  </p:clrMapOvr>
+</p:sld>
+</file>
+
+<file path=ppt/slides/slide3.xml><?xml version="1.0" encoding="utf-8"?>
+<p:sld xmlns:a="http://schemas.openxmlformats.org/drawingml/2006/main" xmlns:r="http://schemas.openxmlformats.org/officeDocument/2006/relationships" xmlns:p="http://schemas.openxmlformats.org/presentationml/2006/main">
+  <p:cSld>
+    <p:spTree>
+      <p:nvGrpSpPr>
+        <p:cNvPr id="1" name=""/>
+        <p:cNvGrpSpPr/>
+        <p:nvPr/>
+      </p:nvGrpSpPr>
+      <p:grpSpPr>
+        <a:xfrm>
+          <a:off x="0" y="0"/>
+          <a:ext cx="0" cy="0"/>
+          <a:chOff x="0" y="0"/>
+          <a:chExt cx="0" cy="0"/>
+        </a:xfrm>
+      </p:grpSpPr>
+      <p:sp>
+        <p:nvSpPr>
+          <p:cNvPr id="4" name="文字方塊 3">
+            <a:extLst>
+              <a:ext uri="{FF2B5EF4-FFF2-40B4-BE49-F238E27FC236}">
+                <a16:creationId xmlns:a16="http://schemas.microsoft.com/office/drawing/2014/main" id="{2668DEDE-1FC0-41C8-9F0C-E3F8371F63BA}"/>
+              </a:ext>
+            </a:extLst>
+          </p:cNvPr>
+          <p:cNvSpPr txBox="1"/>
+          <p:nvPr/>
+        </p:nvSpPr>
+        <p:spPr>
+          <a:xfrm>
+            <a:off x="254000" y="172720"/>
+            <a:ext cx="11521440" cy="1754326"/>
+          </a:xfrm>
+          <a:prstGeom prst="rect">
+            <a:avLst/>
+          </a:prstGeom>
+          <a:noFill/>
+        </p:spPr>
+        <p:txBody>
+          <a:bodyPr wrap="square" rtlCol="0">
+            <a:spAutoFit/>
+          </a:bodyPr>
+          <a:lstStyle/>
+          <a:p>
+            <a:r>
+              <a:rPr lang="en-US" altLang="zh-TW" b="1" u="sng" dirty="0" err="1"/>
+              <a:t>LinkedHashMap</a:t>
+            </a:r>
+            <a:endParaRPr lang="en-US" altLang="zh-TW" b="1" u="sng" dirty="0"/>
+          </a:p>
+          <a:p>
+            <a:endParaRPr lang="en-US" altLang="zh-TW" dirty="0"/>
+          </a:p>
+          <a:p>
+            <a:r>
+              <a:rPr lang="en-US" altLang="zh-TW" dirty="0"/>
+              <a:t>	</a:t>
+            </a:r>
+            <a:r>
+              <a:rPr lang="en-US" altLang="zh-TW" dirty="0" err="1"/>
+              <a:t>LinkedHashMap</a:t>
+            </a:r>
+            <a:r>
+              <a:rPr lang="zh-TW" altLang="en-US" dirty="0"/>
+              <a:t>使用双向链表来维护</a:t>
+            </a:r>
+            <a:r>
+              <a:rPr lang="en-US" altLang="zh-TW" dirty="0"/>
+              <a:t>key-value</a:t>
+            </a:r>
+            <a:r>
+              <a:rPr lang="zh-CN" altLang="en-US" dirty="0"/>
+              <a:t>对的顺序（其实只需要考虑</a:t>
+            </a:r>
+            <a:r>
+              <a:rPr lang="en-US" altLang="zh-CN" dirty="0"/>
+              <a:t>key</a:t>
+            </a:r>
+            <a:r>
+              <a:rPr lang="zh-CN" altLang="en-US" dirty="0"/>
+              <a:t>的顺序），该链表负责维护 </a:t>
+            </a:r>
+            <a:endParaRPr lang="en-US" altLang="zh-CN" dirty="0"/>
+          </a:p>
+          <a:p>
+            <a:r>
+              <a:rPr lang="en-US" altLang="zh-CN" dirty="0"/>
+              <a:t>                 Map</a:t>
+            </a:r>
+            <a:r>
+              <a:rPr lang="zh-CN" altLang="en-US" dirty="0"/>
+              <a:t>的迭代顺序，迭代顺序与</a:t>
+            </a:r>
+            <a:r>
+              <a:rPr lang="en-US" altLang="zh-CN" dirty="0"/>
+              <a:t>key-value</a:t>
+            </a:r>
+            <a:r>
+              <a:rPr lang="zh-CN" altLang="en-US" dirty="0"/>
+              <a:t>对的插入顺序保持一致。</a:t>
+            </a:r>
+            <a:r>
+              <a:rPr lang="en-US" altLang="zh-TW" dirty="0" err="1"/>
+              <a:t>LinkedHashMap</a:t>
+            </a:r>
+            <a:r>
+              <a:rPr lang="zh-TW" altLang="en-US" dirty="0"/>
+              <a:t>可以避免对</a:t>
+            </a:r>
+            <a:r>
+              <a:rPr lang="en-US" altLang="zh-TW" dirty="0"/>
+              <a:t>HashMap</a:t>
+            </a:r>
+            <a:r>
+              <a:rPr lang="zh-TW" altLang="en-US" dirty="0"/>
+              <a:t>、</a:t>
+            </a:r>
+            <a:endParaRPr lang="en-US" altLang="zh-TW" dirty="0"/>
+          </a:p>
+          <a:p>
+            <a:r>
+              <a:rPr lang="en-US" altLang="zh-TW" dirty="0"/>
+              <a:t>                 </a:t>
+            </a:r>
+            <a:r>
+              <a:rPr lang="en-US" altLang="zh-TW" dirty="0" err="1"/>
+              <a:t>Hashtable</a:t>
+            </a:r>
+            <a:r>
+              <a:rPr lang="zh-TW" altLang="en-US" dirty="0"/>
+              <a:t>里的</a:t>
+            </a:r>
+            <a:r>
+              <a:rPr lang="en-US" altLang="zh-TW" dirty="0"/>
+              <a:t>key-value</a:t>
+            </a:r>
+            <a:r>
+              <a:rPr lang="zh-TW" altLang="en-US" dirty="0"/>
+              <a:t>对</a:t>
+            </a:r>
+            <a:r>
+              <a:rPr lang="zh-CN" altLang="en-US" dirty="0"/>
+              <a:t>进行排序（只要插入</a:t>
+            </a:r>
+            <a:r>
+              <a:rPr lang="en-US" altLang="zh-CN" dirty="0"/>
+              <a:t>key-value</a:t>
+            </a:r>
+            <a:r>
+              <a:rPr lang="zh-CN" altLang="en-US" dirty="0"/>
+              <a:t>对时保持顺序即可），同时又可避免使</a:t>
+            </a:r>
+            <a:r>
+              <a:rPr lang="zh-TW" altLang="en-US" dirty="0"/>
+              <a:t>用</a:t>
+            </a:r>
+            <a:r>
+              <a:rPr lang="en-US" altLang="zh-TW" dirty="0" err="1"/>
+              <a:t>TreeMap</a:t>
+            </a:r>
+            <a:endParaRPr lang="en-US" altLang="zh-TW" dirty="0"/>
+          </a:p>
+          <a:p>
+            <a:r>
+              <a:rPr lang="en-US" altLang="zh-TW" dirty="0"/>
+              <a:t>                 </a:t>
+            </a:r>
+            <a:r>
+              <a:rPr lang="zh-TW" altLang="en-US" dirty="0"/>
+              <a:t>所增加的成本。</a:t>
+            </a:r>
+          </a:p>
+        </p:txBody>
+      </p:sp>
+    </p:spTree>
+    <p:extLst>
+      <p:ext uri="{BB962C8B-B14F-4D97-AF65-F5344CB8AC3E}">
+        <p14:creationId xmlns:p14="http://schemas.microsoft.com/office/powerpoint/2010/main" val="3616098934"/>
       </p:ext>
     </p:extLst>
   </p:cSld>

</xml_diff>

<commit_message>
Add the properties into pptx
</commit_message>
<xml_diff>
--- a/JavaStudy/JavaStudyNote/Collection-Map/Java_Map.pptx
+++ b/JavaStudy/JavaStudyNote/Collection-Map/Java_Map.pptx
@@ -8,6 +8,7 @@
     <p:sldId id="256" r:id="rId2"/>
     <p:sldId id="257" r:id="rId3"/>
     <p:sldId id="258" r:id="rId4"/>
+    <p:sldId id="259" r:id="rId5"/>
   </p:sldIdLst>
   <p:sldSz cx="12192000" cy="6858000"/>
   <p:notesSz cx="6858000" cy="9144000"/>
@@ -3832,6 +3833,175 @@
 </p:sld>
 </file>
 
+<file path=ppt/slides/slide4.xml><?xml version="1.0" encoding="utf-8"?>
+<p:sld xmlns:a="http://schemas.openxmlformats.org/drawingml/2006/main" xmlns:r="http://schemas.openxmlformats.org/officeDocument/2006/relationships" xmlns:p="http://schemas.openxmlformats.org/presentationml/2006/main">
+  <p:cSld>
+    <p:spTree>
+      <p:nvGrpSpPr>
+        <p:cNvPr id="1" name=""/>
+        <p:cNvGrpSpPr/>
+        <p:nvPr/>
+      </p:nvGrpSpPr>
+      <p:grpSpPr>
+        <a:xfrm>
+          <a:off x="0" y="0"/>
+          <a:ext cx="0" cy="0"/>
+          <a:chOff x="0" y="0"/>
+          <a:chExt cx="0" cy="0"/>
+        </a:xfrm>
+      </p:grpSpPr>
+      <p:sp>
+        <p:nvSpPr>
+          <p:cNvPr id="4" name="文字方塊 3">
+            <a:extLst>
+              <a:ext uri="{FF2B5EF4-FFF2-40B4-BE49-F238E27FC236}">
+                <a16:creationId xmlns:a16="http://schemas.microsoft.com/office/drawing/2014/main" id="{A32972CC-1A00-47D2-8FAC-390680B053DF}"/>
+              </a:ext>
+            </a:extLst>
+          </p:cNvPr>
+          <p:cNvSpPr txBox="1"/>
+          <p:nvPr/>
+        </p:nvSpPr>
+        <p:spPr>
+          <a:xfrm>
+            <a:off x="416560" y="436880"/>
+            <a:ext cx="11949105" cy="1477328"/>
+          </a:xfrm>
+          <a:prstGeom prst="rect">
+            <a:avLst/>
+          </a:prstGeom>
+          <a:noFill/>
+        </p:spPr>
+        <p:txBody>
+          <a:bodyPr wrap="none" rtlCol="0">
+            <a:spAutoFit/>
+          </a:bodyPr>
+          <a:lstStyle/>
+          <a:p>
+            <a:r>
+              <a:rPr lang="en-US" altLang="zh-CN" dirty="0"/>
+              <a:t>Properties</a:t>
+            </a:r>
+          </a:p>
+          <a:p>
+            <a:endParaRPr lang="en-US" altLang="zh-TW" dirty="0"/>
+          </a:p>
+          <a:p>
+            <a:r>
+              <a:rPr lang="en-US" altLang="zh-TW" dirty="0"/>
+              <a:t>	</a:t>
+            </a:r>
+            <a:r>
+              <a:rPr lang="en-US" altLang="zh-CN" dirty="0"/>
+              <a:t>Properties</a:t>
+            </a:r>
+            <a:r>
+              <a:rPr lang="zh-CN" altLang="en-US" dirty="0"/>
+              <a:t>类可以把</a:t>
+            </a:r>
+            <a:r>
+              <a:rPr lang="en-US" altLang="zh-CN" dirty="0"/>
+              <a:t>Map</a:t>
+            </a:r>
+            <a:r>
+              <a:rPr lang="zh-CN" altLang="en-US" dirty="0"/>
+              <a:t>对象和属性文件关联起来，从而可以把</a:t>
+            </a:r>
+            <a:r>
+              <a:rPr lang="en-US" altLang="zh-CN" dirty="0"/>
+              <a:t>Map</a:t>
+            </a:r>
+            <a:r>
+              <a:rPr lang="zh-CN" altLang="en-US" dirty="0"/>
+              <a:t>对象中的</a:t>
+            </a:r>
+            <a:r>
+              <a:rPr lang="en-US" altLang="zh-CN" dirty="0"/>
+              <a:t>key-value</a:t>
+            </a:r>
+            <a:r>
+              <a:rPr lang="zh-CN" altLang="en-US" dirty="0"/>
+              <a:t>对写入属性文件中，</a:t>
+            </a:r>
+            <a:endParaRPr lang="en-US" altLang="zh-CN" dirty="0"/>
+          </a:p>
+          <a:p>
+            <a:r>
+              <a:rPr lang="zh-CN" altLang="en-US" dirty="0"/>
+              <a:t>                 也可以把属性文件中的“属性名</a:t>
+            </a:r>
+            <a:r>
+              <a:rPr lang="en-US" altLang="zh-CN" dirty="0"/>
+              <a:t>=</a:t>
+            </a:r>
+            <a:r>
+              <a:rPr lang="zh-CN" altLang="en-US" dirty="0"/>
+              <a:t>属性值”加载到</a:t>
+            </a:r>
+            <a:r>
+              <a:rPr lang="en-US" altLang="zh-CN" dirty="0"/>
+              <a:t>Map</a:t>
+            </a:r>
+            <a:r>
+              <a:rPr lang="zh-CN" altLang="en-US" dirty="0"/>
+              <a:t>对象中。由于属性文件里的属</a:t>
+            </a:r>
+            <a:r>
+              <a:rPr lang="zh-TW" altLang="en-US" dirty="0"/>
+              <a:t>性名、属性值只能是字符串</a:t>
+            </a:r>
+            <a:endParaRPr lang="en-US" altLang="zh-TW" dirty="0"/>
+          </a:p>
+          <a:p>
+            <a:r>
+              <a:rPr lang="zh-TW" altLang="en-US"/>
+              <a:t>                 类型，所以</a:t>
+            </a:r>
+            <a:r>
+              <a:rPr lang="en-US" altLang="zh-TW" dirty="0"/>
+              <a:t>Properties</a:t>
+            </a:r>
+            <a:r>
+              <a:rPr lang="zh-TW" altLang="en-US" dirty="0"/>
+              <a:t>里的</a:t>
+            </a:r>
+            <a:r>
+              <a:rPr lang="en-US" altLang="zh-TW" dirty="0"/>
+              <a:t>key</a:t>
+            </a:r>
+            <a:r>
+              <a:rPr lang="zh-TW" altLang="en-US" dirty="0"/>
+              <a:t>、</a:t>
+            </a:r>
+            <a:r>
+              <a:rPr lang="en-US" altLang="zh-TW" dirty="0"/>
+              <a:t>value</a:t>
+            </a:r>
+            <a:r>
+              <a:rPr lang="zh-TW" altLang="en-US" dirty="0"/>
+              <a:t>都</a:t>
+            </a:r>
+            <a:r>
+              <a:rPr lang="zh-CN" altLang="en-US" dirty="0"/>
+              <a:t>是字符串类型。</a:t>
+            </a:r>
+            <a:endParaRPr lang="zh-TW" altLang="en-US" dirty="0"/>
+          </a:p>
+        </p:txBody>
+      </p:sp>
+    </p:spTree>
+    <p:extLst>
+      <p:ext uri="{BB962C8B-B14F-4D97-AF65-F5344CB8AC3E}">
+        <p14:creationId xmlns:p14="http://schemas.microsoft.com/office/powerpoint/2010/main" val="626848409"/>
+      </p:ext>
+    </p:extLst>
+  </p:cSld>
+  <p:clrMapOvr>
+    <a:masterClrMapping/>
+  </p:clrMapOvr>
+</p:sld>
+</file>
+
 <file path=ppt/theme/theme1.xml><?xml version="1.0" encoding="utf-8"?>
 <a:theme xmlns:a="http://schemas.openxmlformats.org/drawingml/2006/main" name="Office 佈景主題">
   <a:themeElements>

</xml_diff>

<commit_message>
Add the TreeMap into pptx
</commit_message>
<xml_diff>
--- a/JavaStudy/JavaStudyNote/Collection-Map/Java_Map.pptx
+++ b/JavaStudy/JavaStudyNote/Collection-Map/Java_Map.pptx
@@ -9,6 +9,7 @@
     <p:sldId id="257" r:id="rId3"/>
     <p:sldId id="258" r:id="rId4"/>
     <p:sldId id="259" r:id="rId5"/>
+    <p:sldId id="260" r:id="rId6"/>
   </p:sldIdLst>
   <p:sldSz cx="12192000" cy="6858000"/>
   <p:notesSz cx="6858000" cy="9144000"/>
@@ -3864,7 +3865,7 @@
         </p:nvSpPr>
         <p:spPr>
           <a:xfrm>
-            <a:off x="416560" y="436880"/>
+            <a:off x="345440" y="182880"/>
             <a:ext cx="11949105" cy="1477328"/>
           </a:xfrm>
           <a:prstGeom prst="rect">
@@ -3879,22 +3880,22 @@
           <a:lstStyle/>
           <a:p>
             <a:r>
+              <a:rPr lang="en-US" altLang="zh-CN" b="1" u="sng" dirty="0"/>
+              <a:t>Properties</a:t>
+            </a:r>
+          </a:p>
+          <a:p>
+            <a:endParaRPr lang="en-US" altLang="zh-TW" dirty="0"/>
+          </a:p>
+          <a:p>
+            <a:r>
+              <a:rPr lang="en-US" altLang="zh-TW" dirty="0"/>
+              <a:t>	</a:t>
+            </a:r>
+            <a:r>
               <a:rPr lang="en-US" altLang="zh-CN" dirty="0"/>
               <a:t>Properties</a:t>
             </a:r>
-          </a:p>
-          <a:p>
-            <a:endParaRPr lang="en-US" altLang="zh-TW" dirty="0"/>
-          </a:p>
-          <a:p>
-            <a:r>
-              <a:rPr lang="en-US" altLang="zh-TW" dirty="0"/>
-              <a:t>	</a:t>
-            </a:r>
-            <a:r>
-              <a:rPr lang="en-US" altLang="zh-CN" dirty="0"/>
-              <a:t>Properties</a:t>
-            </a:r>
             <a:r>
               <a:rPr lang="zh-CN" altLang="en-US" dirty="0"/>
               <a:t>类可以把</a:t>
@@ -3954,7 +3955,7 @@
           </a:p>
           <a:p>
             <a:r>
-              <a:rPr lang="zh-TW" altLang="en-US"/>
+              <a:rPr lang="zh-TW" altLang="en-US" dirty="0"/>
               <a:t>                 类型，所以</a:t>
             </a:r>
             <a:r>
@@ -3993,6 +3994,305 @@
     <p:extLst>
       <p:ext uri="{BB962C8B-B14F-4D97-AF65-F5344CB8AC3E}">
         <p14:creationId xmlns:p14="http://schemas.microsoft.com/office/powerpoint/2010/main" val="626848409"/>
+      </p:ext>
+    </p:extLst>
+  </p:cSld>
+  <p:clrMapOvr>
+    <a:masterClrMapping/>
+  </p:clrMapOvr>
+</p:sld>
+</file>
+
+<file path=ppt/slides/slide5.xml><?xml version="1.0" encoding="utf-8"?>
+<p:sld xmlns:a="http://schemas.openxmlformats.org/drawingml/2006/main" xmlns:r="http://schemas.openxmlformats.org/officeDocument/2006/relationships" xmlns:p="http://schemas.openxmlformats.org/presentationml/2006/main">
+  <p:cSld>
+    <p:spTree>
+      <p:nvGrpSpPr>
+        <p:cNvPr id="1" name=""/>
+        <p:cNvGrpSpPr/>
+        <p:nvPr/>
+      </p:nvGrpSpPr>
+      <p:grpSpPr>
+        <a:xfrm>
+          <a:off x="0" y="0"/>
+          <a:ext cx="0" cy="0"/>
+          <a:chOff x="0" y="0"/>
+          <a:chExt cx="0" cy="0"/>
+        </a:xfrm>
+      </p:grpSpPr>
+      <p:sp>
+        <p:nvSpPr>
+          <p:cNvPr id="4" name="文字方塊 3">
+            <a:extLst>
+              <a:ext uri="{FF2B5EF4-FFF2-40B4-BE49-F238E27FC236}">
+                <a16:creationId xmlns:a16="http://schemas.microsoft.com/office/drawing/2014/main" id="{A46A06B7-B0C9-4651-A0E6-352EC697753D}"/>
+              </a:ext>
+            </a:extLst>
+          </p:cNvPr>
+          <p:cNvSpPr txBox="1"/>
+          <p:nvPr/>
+        </p:nvSpPr>
+        <p:spPr>
+          <a:xfrm>
+            <a:off x="233680" y="335280"/>
+            <a:ext cx="12437764" cy="2031325"/>
+          </a:xfrm>
+          <a:prstGeom prst="rect">
+            <a:avLst/>
+          </a:prstGeom>
+          <a:noFill/>
+        </p:spPr>
+        <p:txBody>
+          <a:bodyPr wrap="none" rtlCol="0">
+            <a:spAutoFit/>
+          </a:bodyPr>
+          <a:lstStyle/>
+          <a:p>
+            <a:r>
+              <a:rPr lang="en-US" altLang="zh-CN" b="1" u="sng" dirty="0" err="1"/>
+              <a:t>TreeMap</a:t>
+            </a:r>
+            <a:endParaRPr lang="en-US" altLang="zh-CN" b="1" u="sng" dirty="0"/>
+          </a:p>
+          <a:p>
+            <a:endParaRPr lang="en-US" altLang="zh-TW" dirty="0"/>
+          </a:p>
+          <a:p>
+            <a:r>
+              <a:rPr lang="en-US" altLang="zh-TW" dirty="0"/>
+              <a:t>	Map </a:t>
+            </a:r>
+            <a:r>
+              <a:rPr lang="zh-TW" altLang="en-US" dirty="0"/>
+              <a:t>接口派生出一个</a:t>
+            </a:r>
+            <a:r>
+              <a:rPr lang="en-US" altLang="zh-TW" dirty="0" err="1"/>
+              <a:t>SortedMap</a:t>
+            </a:r>
+            <a:r>
+              <a:rPr lang="en-US" altLang="zh-TW" dirty="0"/>
+              <a:t> </a:t>
+            </a:r>
+            <a:r>
+              <a:rPr lang="zh-TW" altLang="en-US" dirty="0"/>
+              <a:t>子接口，</a:t>
+            </a:r>
+            <a:r>
+              <a:rPr lang="en-US" altLang="zh-TW" dirty="0" err="1"/>
+              <a:t>SortedMap</a:t>
+            </a:r>
+            <a:r>
+              <a:rPr lang="zh-TW" altLang="en-US" dirty="0"/>
+              <a:t>接口也有一个</a:t>
+            </a:r>
+            <a:r>
+              <a:rPr lang="en-US" altLang="zh-TW" dirty="0" err="1"/>
+              <a:t>TreeMap</a:t>
+            </a:r>
+            <a:r>
+              <a:rPr lang="zh-TW" altLang="en-US" dirty="0"/>
+              <a:t>实现类。</a:t>
+            </a:r>
+          </a:p>
+          <a:p>
+            <a:r>
+              <a:rPr lang="en-US" altLang="zh-CN" dirty="0"/>
+              <a:t>                 </a:t>
+            </a:r>
+            <a:r>
+              <a:rPr lang="en-US" altLang="zh-CN" dirty="0" err="1"/>
+              <a:t>TreeMap</a:t>
+            </a:r>
+            <a:r>
+              <a:rPr lang="zh-CN" altLang="en-US" dirty="0"/>
+              <a:t>就是一个红黑树数据结构，每个</a:t>
+            </a:r>
+            <a:r>
+              <a:rPr lang="en-US" altLang="zh-CN" dirty="0"/>
+              <a:t>key-value</a:t>
+            </a:r>
+            <a:r>
+              <a:rPr lang="zh-CN" altLang="en-US" dirty="0"/>
+              <a:t>对即作为红黑树的一个节点。</a:t>
+            </a:r>
+            <a:r>
+              <a:rPr lang="en-US" altLang="zh-CN" dirty="0" err="1"/>
+              <a:t>TreeMap</a:t>
+            </a:r>
+            <a:r>
+              <a:rPr lang="zh-CN" altLang="en-US" dirty="0"/>
+              <a:t>存储</a:t>
+            </a:r>
+            <a:r>
+              <a:rPr lang="en-US" altLang="zh-CN" dirty="0"/>
+              <a:t>key-value</a:t>
+            </a:r>
+            <a:r>
+              <a:rPr lang="zh-CN" altLang="en-US" dirty="0"/>
+              <a:t>对</a:t>
+            </a:r>
+            <a:endParaRPr lang="en-US" altLang="zh-CN" dirty="0"/>
+          </a:p>
+          <a:p>
+            <a:r>
+              <a:rPr lang="zh-CN" altLang="en-US" dirty="0"/>
+              <a:t>              （节点）时，需要根据</a:t>
+            </a:r>
+            <a:r>
+              <a:rPr lang="en-US" altLang="zh-CN" dirty="0"/>
+              <a:t>key</a:t>
+            </a:r>
+            <a:r>
+              <a:rPr lang="zh-CN" altLang="en-US" dirty="0"/>
+              <a:t>对节点进行排序</a:t>
+            </a:r>
+            <a:r>
+              <a:rPr lang="en-US" altLang="zh-CN" dirty="0"/>
+              <a:t>,</a:t>
+            </a:r>
+            <a:r>
+              <a:rPr lang="zh-CN" altLang="en-US" dirty="0"/>
+              <a:t>所以對保存的類需要實現</a:t>
+            </a:r>
+            <a:r>
+              <a:rPr lang="en-US" altLang="zh-CN" dirty="0"/>
+              <a:t>comparable</a:t>
+            </a:r>
+            <a:r>
+              <a:rPr lang="zh-CN" altLang="en-US" dirty="0"/>
+              <a:t>接口或者</a:t>
+            </a:r>
+            <a:r>
+              <a:rPr lang="en-US" altLang="zh-CN" dirty="0"/>
+              <a:t>new</a:t>
+            </a:r>
+            <a:r>
+              <a:rPr lang="zh-CN" altLang="en-US" dirty="0"/>
+              <a:t>對象的時候實現</a:t>
+            </a:r>
+            <a:endParaRPr lang="en-US" altLang="zh-CN" dirty="0"/>
+          </a:p>
+          <a:p>
+            <a:r>
+              <a:rPr lang="en-US" altLang="zh-CN" dirty="0"/>
+              <a:t>	</a:t>
+            </a:r>
+            <a:r>
+              <a:rPr lang="en-US" altLang="zh-CN" dirty="0" err="1"/>
+              <a:t>compartor</a:t>
+            </a:r>
+            <a:r>
+              <a:rPr lang="zh-CN" altLang="en-US" dirty="0"/>
+              <a:t>類</a:t>
+            </a:r>
+            <a:r>
+              <a:rPr lang="en-US" altLang="zh-CN" dirty="0"/>
+              <a:t>. </a:t>
+            </a:r>
+            <a:r>
+              <a:rPr lang="en-US" altLang="zh-CN" dirty="0" err="1"/>
+              <a:t>TreeMap</a:t>
+            </a:r>
+            <a:r>
+              <a:rPr lang="zh-CN" altLang="en-US" dirty="0"/>
+              <a:t>可以保证所有的</a:t>
+            </a:r>
+            <a:r>
+              <a:rPr lang="en-US" altLang="zh-CN" dirty="0"/>
+              <a:t>key-value</a:t>
+            </a:r>
+            <a:r>
+              <a:rPr lang="zh-CN" altLang="en-US" dirty="0"/>
+              <a:t>对处于有序状态。</a:t>
+            </a:r>
+            <a:r>
+              <a:rPr lang="en-US" altLang="zh-CN" dirty="0" err="1"/>
+              <a:t>TreeSet</a:t>
+            </a:r>
+            <a:r>
+              <a:rPr lang="zh-CN" altLang="en-US" dirty="0"/>
+              <a:t>中判断两个元素相等的标准，</a:t>
+            </a:r>
+            <a:endParaRPr lang="en-US" altLang="zh-CN" dirty="0"/>
+          </a:p>
+          <a:p>
+            <a:r>
+              <a:rPr lang="en-US" altLang="zh-CN" dirty="0"/>
+              <a:t>                 </a:t>
+            </a:r>
+            <a:r>
+              <a:rPr lang="en-US" altLang="zh-CN" dirty="0" err="1"/>
+              <a:t>TreeMap</a:t>
+            </a:r>
+            <a:r>
+              <a:rPr lang="zh-CN" altLang="en-US" dirty="0"/>
+              <a:t>中判断两个</a:t>
+            </a:r>
+            <a:r>
+              <a:rPr lang="en-US" altLang="zh-TW" dirty="0"/>
+              <a:t>key</a:t>
+            </a:r>
+            <a:r>
+              <a:rPr lang="zh-TW" altLang="en-US" dirty="0"/>
+              <a:t>相等的标准是：两个</a:t>
+            </a:r>
+            <a:r>
+              <a:rPr lang="en-US" altLang="zh-TW" dirty="0"/>
+              <a:t>key</a:t>
+            </a:r>
+            <a:r>
+              <a:rPr lang="zh-TW" altLang="en-US" dirty="0"/>
+              <a:t>通过</a:t>
+            </a:r>
+            <a:r>
+              <a:rPr lang="en-US" altLang="zh-TW" dirty="0" err="1"/>
+              <a:t>compareTo</a:t>
+            </a:r>
+            <a:r>
+              <a:rPr lang="en-US" altLang="zh-TW" dirty="0"/>
+              <a:t>()</a:t>
+            </a:r>
+            <a:r>
+              <a:rPr lang="zh-TW" altLang="en-US" dirty="0"/>
+              <a:t>方法返回</a:t>
+            </a:r>
+            <a:r>
+              <a:rPr lang="en-US" altLang="zh-TW" dirty="0"/>
+              <a:t> 0</a:t>
+            </a:r>
+            <a:r>
+              <a:rPr lang="zh-TW" altLang="en-US" dirty="0"/>
+              <a:t>，</a:t>
+            </a:r>
+            <a:r>
+              <a:rPr lang="en-US" altLang="zh-TW" dirty="0" err="1"/>
+              <a:t>TreeMap</a:t>
+            </a:r>
+            <a:r>
+              <a:rPr lang="zh-TW" altLang="en-US" dirty="0"/>
+              <a:t>即认</a:t>
+            </a:r>
+            <a:r>
+              <a:rPr lang="zh-CN" altLang="en-US" dirty="0"/>
+              <a:t>为这两个</a:t>
+            </a:r>
+            <a:r>
+              <a:rPr lang="en-US" altLang="zh-CN" dirty="0"/>
+              <a:t>key</a:t>
+            </a:r>
+            <a:r>
+              <a:rPr lang="zh-CN" altLang="en-US" dirty="0"/>
+              <a:t>是相等的。</a:t>
+            </a:r>
+            <a:endParaRPr lang="zh-TW" altLang="en-US" dirty="0"/>
+          </a:p>
+        </p:txBody>
+      </p:sp>
+    </p:spTree>
+    <p:extLst>
+      <p:ext uri="{BB962C8B-B14F-4D97-AF65-F5344CB8AC3E}">
+        <p14:creationId xmlns:p14="http://schemas.microsoft.com/office/powerpoint/2010/main" val="832642861"/>
       </p:ext>
     </p:extLst>
   </p:cSld>

</xml_diff>

<commit_message>
Add the WeakHashMap in pptx
</commit_message>
<xml_diff>
--- a/JavaStudy/JavaStudyNote/Collection-Map/Java_Map.pptx
+++ b/JavaStudy/JavaStudyNote/Collection-Map/Java_Map.pptx
@@ -10,6 +10,7 @@
     <p:sldId id="258" r:id="rId4"/>
     <p:sldId id="259" r:id="rId5"/>
     <p:sldId id="260" r:id="rId6"/>
+    <p:sldId id="261" r:id="rId7"/>
   </p:sldIdLst>
   <p:sldSz cx="12192000" cy="6858000"/>
   <p:notesSz cx="6858000" cy="9144000"/>
@@ -263,7 +264,7 @@
           <a:p>
             <a:fld id="{3AEC4CB6-210D-441B-A112-5009B0B7ACC5}" type="datetimeFigureOut">
               <a:rPr lang="zh-TW" altLang="en-US" smtClean="0"/>
-              <a:t>2023/2/10</a:t>
+              <a:t>2023/2/11</a:t>
             </a:fld>
             <a:endParaRPr lang="zh-TW" altLang="en-US"/>
           </a:p>
@@ -461,7 +462,7 @@
           <a:p>
             <a:fld id="{3AEC4CB6-210D-441B-A112-5009B0B7ACC5}" type="datetimeFigureOut">
               <a:rPr lang="zh-TW" altLang="en-US" smtClean="0"/>
-              <a:t>2023/2/10</a:t>
+              <a:t>2023/2/11</a:t>
             </a:fld>
             <a:endParaRPr lang="zh-TW" altLang="en-US"/>
           </a:p>
@@ -669,7 +670,7 @@
           <a:p>
             <a:fld id="{3AEC4CB6-210D-441B-A112-5009B0B7ACC5}" type="datetimeFigureOut">
               <a:rPr lang="zh-TW" altLang="en-US" smtClean="0"/>
-              <a:t>2023/2/10</a:t>
+              <a:t>2023/2/11</a:t>
             </a:fld>
             <a:endParaRPr lang="zh-TW" altLang="en-US"/>
           </a:p>
@@ -867,7 +868,7 @@
           <a:p>
             <a:fld id="{3AEC4CB6-210D-441B-A112-5009B0B7ACC5}" type="datetimeFigureOut">
               <a:rPr lang="zh-TW" altLang="en-US" smtClean="0"/>
-              <a:t>2023/2/10</a:t>
+              <a:t>2023/2/11</a:t>
             </a:fld>
             <a:endParaRPr lang="zh-TW" altLang="en-US"/>
           </a:p>
@@ -1142,7 +1143,7 @@
           <a:p>
             <a:fld id="{3AEC4CB6-210D-441B-A112-5009B0B7ACC5}" type="datetimeFigureOut">
               <a:rPr lang="zh-TW" altLang="en-US" smtClean="0"/>
-              <a:t>2023/2/10</a:t>
+              <a:t>2023/2/11</a:t>
             </a:fld>
             <a:endParaRPr lang="zh-TW" altLang="en-US"/>
           </a:p>
@@ -1407,7 +1408,7 @@
           <a:p>
             <a:fld id="{3AEC4CB6-210D-441B-A112-5009B0B7ACC5}" type="datetimeFigureOut">
               <a:rPr lang="zh-TW" altLang="en-US" smtClean="0"/>
-              <a:t>2023/2/10</a:t>
+              <a:t>2023/2/11</a:t>
             </a:fld>
             <a:endParaRPr lang="zh-TW" altLang="en-US"/>
           </a:p>
@@ -1819,7 +1820,7 @@
           <a:p>
             <a:fld id="{3AEC4CB6-210D-441B-A112-5009B0B7ACC5}" type="datetimeFigureOut">
               <a:rPr lang="zh-TW" altLang="en-US" smtClean="0"/>
-              <a:t>2023/2/10</a:t>
+              <a:t>2023/2/11</a:t>
             </a:fld>
             <a:endParaRPr lang="zh-TW" altLang="en-US"/>
           </a:p>
@@ -1960,7 +1961,7 @@
           <a:p>
             <a:fld id="{3AEC4CB6-210D-441B-A112-5009B0B7ACC5}" type="datetimeFigureOut">
               <a:rPr lang="zh-TW" altLang="en-US" smtClean="0"/>
-              <a:t>2023/2/10</a:t>
+              <a:t>2023/2/11</a:t>
             </a:fld>
             <a:endParaRPr lang="zh-TW" altLang="en-US"/>
           </a:p>
@@ -2073,7 +2074,7 @@
           <a:p>
             <a:fld id="{3AEC4CB6-210D-441B-A112-5009B0B7ACC5}" type="datetimeFigureOut">
               <a:rPr lang="zh-TW" altLang="en-US" smtClean="0"/>
-              <a:t>2023/2/10</a:t>
+              <a:t>2023/2/11</a:t>
             </a:fld>
             <a:endParaRPr lang="zh-TW" altLang="en-US"/>
           </a:p>
@@ -2384,7 +2385,7 @@
           <a:p>
             <a:fld id="{3AEC4CB6-210D-441B-A112-5009B0B7ACC5}" type="datetimeFigureOut">
               <a:rPr lang="zh-TW" altLang="en-US" smtClean="0"/>
-              <a:t>2023/2/10</a:t>
+              <a:t>2023/2/11</a:t>
             </a:fld>
             <a:endParaRPr lang="zh-TW" altLang="en-US"/>
           </a:p>
@@ -2672,7 +2673,7 @@
           <a:p>
             <a:fld id="{3AEC4CB6-210D-441B-A112-5009B0B7ACC5}" type="datetimeFigureOut">
               <a:rPr lang="zh-TW" altLang="en-US" smtClean="0"/>
-              <a:t>2023/2/10</a:t>
+              <a:t>2023/2/11</a:t>
             </a:fld>
             <a:endParaRPr lang="zh-TW" altLang="en-US"/>
           </a:p>
@@ -2913,7 +2914,7 @@
           <a:p>
             <a:fld id="{3AEC4CB6-210D-441B-A112-5009B0B7ACC5}" type="datetimeFigureOut">
               <a:rPr lang="zh-TW" altLang="en-US" smtClean="0"/>
-              <a:t>2023/2/10</a:t>
+              <a:t>2023/2/11</a:t>
             </a:fld>
             <a:endParaRPr lang="zh-TW" altLang="en-US"/>
           </a:p>
@@ -4035,7 +4036,7 @@
         <p:spPr>
           <a:xfrm>
             <a:off x="233680" y="335280"/>
-            <a:ext cx="12437764" cy="2031325"/>
+            <a:ext cx="11812144" cy="2308324"/>
           </a:xfrm>
           <a:prstGeom prst="rect">
             <a:avLst/>
@@ -4283,7 +4284,22 @@
             </a:r>
             <a:r>
               <a:rPr lang="zh-CN" altLang="en-US" dirty="0"/>
-              <a:t>是相等的。</a:t>
+              <a:t>是</a:t>
+            </a:r>
+            <a:endParaRPr lang="en-US" altLang="zh-CN" dirty="0"/>
+          </a:p>
+          <a:p>
+            <a:r>
+              <a:rPr lang="en-US" altLang="zh-CN"/>
+              <a:t>                 </a:t>
+            </a:r>
+            <a:r>
+              <a:rPr lang="zh-CN" altLang="en-US"/>
+              <a:t>相等</a:t>
+            </a:r>
+            <a:r>
+              <a:rPr lang="zh-CN" altLang="en-US" dirty="0"/>
+              <a:t>的。</a:t>
             </a:r>
             <a:endParaRPr lang="zh-TW" altLang="en-US" dirty="0"/>
           </a:p>
@@ -4293,6 +4309,82 @@
     <p:extLst>
       <p:ext uri="{BB962C8B-B14F-4D97-AF65-F5344CB8AC3E}">
         <p14:creationId xmlns:p14="http://schemas.microsoft.com/office/powerpoint/2010/main" val="832642861"/>
+      </p:ext>
+    </p:extLst>
+  </p:cSld>
+  <p:clrMapOvr>
+    <a:masterClrMapping/>
+  </p:clrMapOvr>
+</p:sld>
+</file>
+
+<file path=ppt/slides/slide6.xml><?xml version="1.0" encoding="utf-8"?>
+<p:sld xmlns:a="http://schemas.openxmlformats.org/drawingml/2006/main" xmlns:r="http://schemas.openxmlformats.org/officeDocument/2006/relationships" xmlns:p="http://schemas.openxmlformats.org/presentationml/2006/main">
+  <p:cSld>
+    <p:spTree>
+      <p:nvGrpSpPr>
+        <p:cNvPr id="1" name=""/>
+        <p:cNvGrpSpPr/>
+        <p:nvPr/>
+      </p:nvGrpSpPr>
+      <p:grpSpPr>
+        <a:xfrm>
+          <a:off x="0" y="0"/>
+          <a:ext cx="0" cy="0"/>
+          <a:chOff x="0" y="0"/>
+          <a:chExt cx="0" cy="0"/>
+        </a:xfrm>
+      </p:grpSpPr>
+      <p:sp>
+        <p:nvSpPr>
+          <p:cNvPr id="4" name="文字方塊 3">
+            <a:extLst>
+              <a:ext uri="{FF2B5EF4-FFF2-40B4-BE49-F238E27FC236}">
+                <a16:creationId xmlns:a16="http://schemas.microsoft.com/office/drawing/2014/main" id="{2682DFA3-D3A7-47EF-B308-45043E357E4C}"/>
+              </a:ext>
+            </a:extLst>
+          </p:cNvPr>
+          <p:cNvSpPr txBox="1"/>
+          <p:nvPr/>
+        </p:nvSpPr>
+        <p:spPr>
+          <a:xfrm>
+            <a:off x="193040" y="274320"/>
+            <a:ext cx="1640001" cy="923330"/>
+          </a:xfrm>
+          <a:prstGeom prst="rect">
+            <a:avLst/>
+          </a:prstGeom>
+          <a:noFill/>
+        </p:spPr>
+        <p:txBody>
+          <a:bodyPr wrap="none" rtlCol="0">
+            <a:spAutoFit/>
+          </a:bodyPr>
+          <a:lstStyle/>
+          <a:p>
+            <a:r>
+              <a:rPr lang="en-US" altLang="zh-TW" b="1" u="sng" dirty="0" err="1"/>
+              <a:t>WeakHashMap</a:t>
+            </a:r>
+            <a:endParaRPr lang="en-US" altLang="zh-TW" b="1" u="sng" dirty="0"/>
+          </a:p>
+          <a:p>
+            <a:endParaRPr lang="en-US" altLang="zh-TW" dirty="0"/>
+          </a:p>
+          <a:p>
+            <a:r>
+              <a:rPr lang="en-US" altLang="zh-TW" dirty="0"/>
+              <a:t>	</a:t>
+            </a:r>
+            <a:endParaRPr lang="zh-TW" altLang="en-US" dirty="0"/>
+          </a:p>
+        </p:txBody>
+      </p:sp>
+    </p:spTree>
+    <p:extLst>
+      <p:ext uri="{BB962C8B-B14F-4D97-AF65-F5344CB8AC3E}">
+        <p14:creationId xmlns:p14="http://schemas.microsoft.com/office/powerpoint/2010/main" val="1261707933"/>
       </p:ext>
     </p:extLst>
   </p:cSld>

</xml_diff>

<commit_message>
Add the IdentityHashMap into pptx
</commit_message>
<xml_diff>
--- a/JavaStudy/JavaStudyNote/Collection-Map/Java_Map.pptx
+++ b/JavaStudy/JavaStudyNote/Collection-Map/Java_Map.pptx
@@ -11,6 +11,7 @@
     <p:sldId id="259" r:id="rId5"/>
     <p:sldId id="260" r:id="rId6"/>
     <p:sldId id="261" r:id="rId7"/>
+    <p:sldId id="262" r:id="rId8"/>
   </p:sldIdLst>
   <p:sldSz cx="12192000" cy="6858000"/>
   <p:notesSz cx="6858000" cy="9144000"/>
@@ -264,7 +265,7 @@
           <a:p>
             <a:fld id="{3AEC4CB6-210D-441B-A112-5009B0B7ACC5}" type="datetimeFigureOut">
               <a:rPr lang="zh-TW" altLang="en-US" smtClean="0"/>
-              <a:t>2023/2/11</a:t>
+              <a:t>2023/2/13</a:t>
             </a:fld>
             <a:endParaRPr lang="zh-TW" altLang="en-US"/>
           </a:p>
@@ -462,7 +463,7 @@
           <a:p>
             <a:fld id="{3AEC4CB6-210D-441B-A112-5009B0B7ACC5}" type="datetimeFigureOut">
               <a:rPr lang="zh-TW" altLang="en-US" smtClean="0"/>
-              <a:t>2023/2/11</a:t>
+              <a:t>2023/2/13</a:t>
             </a:fld>
             <a:endParaRPr lang="zh-TW" altLang="en-US"/>
           </a:p>
@@ -670,7 +671,7 @@
           <a:p>
             <a:fld id="{3AEC4CB6-210D-441B-A112-5009B0B7ACC5}" type="datetimeFigureOut">
               <a:rPr lang="zh-TW" altLang="en-US" smtClean="0"/>
-              <a:t>2023/2/11</a:t>
+              <a:t>2023/2/13</a:t>
             </a:fld>
             <a:endParaRPr lang="zh-TW" altLang="en-US"/>
           </a:p>
@@ -868,7 +869,7 @@
           <a:p>
             <a:fld id="{3AEC4CB6-210D-441B-A112-5009B0B7ACC5}" type="datetimeFigureOut">
               <a:rPr lang="zh-TW" altLang="en-US" smtClean="0"/>
-              <a:t>2023/2/11</a:t>
+              <a:t>2023/2/13</a:t>
             </a:fld>
             <a:endParaRPr lang="zh-TW" altLang="en-US"/>
           </a:p>
@@ -1143,7 +1144,7 @@
           <a:p>
             <a:fld id="{3AEC4CB6-210D-441B-A112-5009B0B7ACC5}" type="datetimeFigureOut">
               <a:rPr lang="zh-TW" altLang="en-US" smtClean="0"/>
-              <a:t>2023/2/11</a:t>
+              <a:t>2023/2/13</a:t>
             </a:fld>
             <a:endParaRPr lang="zh-TW" altLang="en-US"/>
           </a:p>
@@ -1408,7 +1409,7 @@
           <a:p>
             <a:fld id="{3AEC4CB6-210D-441B-A112-5009B0B7ACC5}" type="datetimeFigureOut">
               <a:rPr lang="zh-TW" altLang="en-US" smtClean="0"/>
-              <a:t>2023/2/11</a:t>
+              <a:t>2023/2/13</a:t>
             </a:fld>
             <a:endParaRPr lang="zh-TW" altLang="en-US"/>
           </a:p>
@@ -1820,7 +1821,7 @@
           <a:p>
             <a:fld id="{3AEC4CB6-210D-441B-A112-5009B0B7ACC5}" type="datetimeFigureOut">
               <a:rPr lang="zh-TW" altLang="en-US" smtClean="0"/>
-              <a:t>2023/2/11</a:t>
+              <a:t>2023/2/13</a:t>
             </a:fld>
             <a:endParaRPr lang="zh-TW" altLang="en-US"/>
           </a:p>
@@ -1961,7 +1962,7 @@
           <a:p>
             <a:fld id="{3AEC4CB6-210D-441B-A112-5009B0B7ACC5}" type="datetimeFigureOut">
               <a:rPr lang="zh-TW" altLang="en-US" smtClean="0"/>
-              <a:t>2023/2/11</a:t>
+              <a:t>2023/2/13</a:t>
             </a:fld>
             <a:endParaRPr lang="zh-TW" altLang="en-US"/>
           </a:p>
@@ -2074,7 +2075,7 @@
           <a:p>
             <a:fld id="{3AEC4CB6-210D-441B-A112-5009B0B7ACC5}" type="datetimeFigureOut">
               <a:rPr lang="zh-TW" altLang="en-US" smtClean="0"/>
-              <a:t>2023/2/11</a:t>
+              <a:t>2023/2/13</a:t>
             </a:fld>
             <a:endParaRPr lang="zh-TW" altLang="en-US"/>
           </a:p>
@@ -2385,7 +2386,7 @@
           <a:p>
             <a:fld id="{3AEC4CB6-210D-441B-A112-5009B0B7ACC5}" type="datetimeFigureOut">
               <a:rPr lang="zh-TW" altLang="en-US" smtClean="0"/>
-              <a:t>2023/2/11</a:t>
+              <a:t>2023/2/13</a:t>
             </a:fld>
             <a:endParaRPr lang="zh-TW" altLang="en-US"/>
           </a:p>
@@ -2673,7 +2674,7 @@
           <a:p>
             <a:fld id="{3AEC4CB6-210D-441B-A112-5009B0B7ACC5}" type="datetimeFigureOut">
               <a:rPr lang="zh-TW" altLang="en-US" smtClean="0"/>
-              <a:t>2023/2/11</a:t>
+              <a:t>2023/2/13</a:t>
             </a:fld>
             <a:endParaRPr lang="zh-TW" altLang="en-US"/>
           </a:p>
@@ -2914,7 +2915,7 @@
           <a:p>
             <a:fld id="{3AEC4CB6-210D-441B-A112-5009B0B7ACC5}" type="datetimeFigureOut">
               <a:rPr lang="zh-TW" altLang="en-US" smtClean="0"/>
-              <a:t>2023/2/11</a:t>
+              <a:t>2023/2/13</a:t>
             </a:fld>
             <a:endParaRPr lang="zh-TW" altLang="en-US"/>
           </a:p>
@@ -4350,7 +4351,7 @@
         <p:spPr>
           <a:xfrm>
             <a:off x="193040" y="274320"/>
-            <a:ext cx="1640001" cy="923330"/>
+            <a:ext cx="11846560" cy="2862322"/>
           </a:xfrm>
           <a:prstGeom prst="rect">
             <a:avLst/>
@@ -4358,7 +4359,7 @@
           <a:noFill/>
         </p:spPr>
         <p:txBody>
-          <a:bodyPr wrap="none" rtlCol="0">
+          <a:bodyPr wrap="square" rtlCol="0">
             <a:spAutoFit/>
           </a:bodyPr>
           <a:lstStyle/>
@@ -4370,6 +4371,202 @@
             <a:endParaRPr lang="en-US" altLang="zh-TW" b="1" u="sng" dirty="0"/>
           </a:p>
           <a:p>
+            <a:endParaRPr lang="en-US" altLang="zh-TW" dirty="0"/>
+          </a:p>
+          <a:p>
+            <a:r>
+              <a:rPr lang="en-US" altLang="zh-TW" dirty="0"/>
+              <a:t>    </a:t>
+            </a:r>
+            <a:r>
+              <a:rPr lang="en-US" altLang="zh-CN" dirty="0"/>
+              <a:t>HashMap</a:t>
+            </a:r>
+            <a:r>
+              <a:rPr lang="zh-CN" altLang="en-US" dirty="0"/>
+              <a:t>和</a:t>
+            </a:r>
+            <a:r>
+              <a:rPr lang="en-US" altLang="zh-CN" dirty="0" err="1"/>
+              <a:t>WeakHash</a:t>
+            </a:r>
+            <a:r>
+              <a:rPr lang="zh-CN" altLang="en-US" dirty="0"/>
+              <a:t>區別</a:t>
+            </a:r>
+            <a:endParaRPr lang="en-US" altLang="zh-TW" dirty="0"/>
+          </a:p>
+          <a:p>
+            <a:r>
+              <a:rPr lang="en-US" altLang="zh-TW" dirty="0"/>
+              <a:t>	</a:t>
+            </a:r>
+            <a:r>
+              <a:rPr lang="en-US" altLang="zh-CN" dirty="0"/>
+              <a:t>HashMap</a:t>
+            </a:r>
+            <a:r>
+              <a:rPr lang="zh-CN" altLang="en-US" dirty="0"/>
+              <a:t>的</a:t>
+            </a:r>
+            <a:r>
+              <a:rPr lang="en-US" altLang="zh-CN" dirty="0"/>
+              <a:t>key</a:t>
+            </a:r>
+            <a:r>
+              <a:rPr lang="zh-CN" altLang="en-US" dirty="0"/>
+              <a:t>保留了对实际对象的强引用，这意味着只要该</a:t>
+            </a:r>
+            <a:r>
+              <a:rPr lang="en-US" altLang="zh-CN" dirty="0"/>
+              <a:t>HashMap</a:t>
+            </a:r>
+            <a:r>
+              <a:rPr lang="zh-CN" altLang="en-US" dirty="0"/>
+              <a:t>对象不被销毁，该</a:t>
+            </a:r>
+            <a:r>
+              <a:rPr lang="en-US" altLang="zh-CN" dirty="0"/>
+              <a:t>HashMap</a:t>
+            </a:r>
+            <a:r>
+              <a:rPr lang="zh-CN" altLang="en-US" dirty="0"/>
+              <a:t>的所有</a:t>
+            </a:r>
+            <a:r>
+              <a:rPr lang="en-US" altLang="zh-CN" dirty="0"/>
+              <a:t>key </a:t>
+            </a:r>
+          </a:p>
+          <a:p>
+            <a:r>
+              <a:rPr lang="en-US" altLang="zh-CN" dirty="0"/>
+              <a:t>                  </a:t>
+            </a:r>
+            <a:r>
+              <a:rPr lang="zh-CN" altLang="en-US" dirty="0"/>
+              <a:t>所引用的对象就不会被垃圾回收，</a:t>
+            </a:r>
+            <a:r>
+              <a:rPr lang="en-US" altLang="zh-TW" dirty="0"/>
+              <a:t>HashMap </a:t>
+            </a:r>
+            <a:r>
+              <a:rPr lang="zh-TW" altLang="en-US" dirty="0"/>
+              <a:t>也不会自动删除这些</a:t>
+            </a:r>
+            <a:r>
+              <a:rPr lang="en-US" altLang="zh-TW" dirty="0"/>
+              <a:t>key </a:t>
+            </a:r>
+            <a:r>
+              <a:rPr lang="zh-TW" altLang="en-US" dirty="0"/>
+              <a:t>所对应的</a:t>
+            </a:r>
+            <a:r>
+              <a:rPr lang="en-US" altLang="zh-TW" dirty="0"/>
+              <a:t>key-value </a:t>
+            </a:r>
+            <a:r>
+              <a:rPr lang="zh-CN" altLang="en-US" dirty="0"/>
+              <a:t>對</a:t>
+            </a:r>
+            <a:endParaRPr lang="en-US" altLang="zh-TW" dirty="0"/>
+          </a:p>
+          <a:p>
+            <a:endParaRPr lang="en-US" altLang="zh-CN" dirty="0"/>
+          </a:p>
+          <a:p>
+            <a:r>
+              <a:rPr lang="en-US" altLang="zh-CN" dirty="0"/>
+              <a:t>                 </a:t>
+            </a:r>
+            <a:r>
+              <a:rPr lang="en-US" altLang="zh-CN" dirty="0" err="1"/>
+              <a:t>WeakHashMap</a:t>
+            </a:r>
+            <a:r>
+              <a:rPr lang="en-US" altLang="zh-CN" dirty="0"/>
+              <a:t> </a:t>
+            </a:r>
+            <a:r>
+              <a:rPr lang="zh-CN" altLang="en-US" dirty="0"/>
+              <a:t>的</a:t>
+            </a:r>
+            <a:r>
+              <a:rPr lang="en-US" altLang="zh-CN" dirty="0"/>
+              <a:t>key </a:t>
+            </a:r>
+            <a:r>
+              <a:rPr lang="zh-CN" altLang="en-US" dirty="0"/>
+              <a:t>只保留了对实际对象的弱引用， 这意味着如果</a:t>
+            </a:r>
+            <a:r>
+              <a:rPr lang="en-US" altLang="zh-CN" dirty="0" err="1"/>
+              <a:t>WeakHashMap</a:t>
+            </a:r>
+            <a:r>
+              <a:rPr lang="zh-CN" altLang="en-US" dirty="0"/>
+              <a:t>对象的</a:t>
+            </a:r>
+            <a:r>
+              <a:rPr lang="en-US" altLang="zh-CN" dirty="0"/>
+              <a:t>key</a:t>
+            </a:r>
+            <a:r>
+              <a:rPr lang="zh-CN" altLang="en-US" dirty="0"/>
+              <a:t>所引用的对象没</a:t>
+            </a:r>
+            <a:endParaRPr lang="en-US" altLang="zh-CN" dirty="0"/>
+          </a:p>
+          <a:p>
+            <a:r>
+              <a:rPr lang="en-US" altLang="zh-CN" dirty="0"/>
+              <a:t>                 </a:t>
+            </a:r>
+            <a:r>
+              <a:rPr lang="zh-CN" altLang="en-US" dirty="0"/>
+              <a:t>有被其他强引用变量所引用，则这些</a:t>
+            </a:r>
+            <a:r>
+              <a:rPr lang="en-US" altLang="zh-CN" dirty="0"/>
+              <a:t>key</a:t>
+            </a:r>
+            <a:r>
+              <a:rPr lang="zh-CN" altLang="en-US" dirty="0"/>
+              <a:t>所引用的对象可能被垃圾回收，</a:t>
+            </a:r>
+            <a:r>
+              <a:rPr lang="en-US" altLang="zh-CN" dirty="0" err="1"/>
+              <a:t>WeakHashMap</a:t>
+            </a:r>
+            <a:r>
+              <a:rPr lang="zh-CN" altLang="en-US" dirty="0"/>
+              <a:t>也可能自动删</a:t>
+            </a:r>
+            <a:r>
+              <a:rPr lang="zh-TW" altLang="en-US" dirty="0"/>
+              <a:t>除这些</a:t>
+            </a:r>
+            <a:endParaRPr lang="en-US" altLang="zh-TW" dirty="0"/>
+          </a:p>
+          <a:p>
+            <a:r>
+              <a:rPr lang="en-US" altLang="zh-TW" dirty="0"/>
+              <a:t>                  key</a:t>
+            </a:r>
+            <a:r>
+              <a:rPr lang="zh-TW" altLang="en-US" dirty="0"/>
+              <a:t>所对应的</a:t>
+            </a:r>
+            <a:r>
+              <a:rPr lang="en-US" altLang="zh-TW" dirty="0"/>
+              <a:t>key-value</a:t>
+            </a:r>
+            <a:r>
+              <a:rPr lang="zh-TW" altLang="en-US" dirty="0"/>
+              <a:t>对。</a:t>
+            </a:r>
             <a:endParaRPr lang="en-US" altLang="zh-TW" dirty="0"/>
           </a:p>
           <a:p>
@@ -4385,6 +4582,160 @@
     <p:extLst>
       <p:ext uri="{BB962C8B-B14F-4D97-AF65-F5344CB8AC3E}">
         <p14:creationId xmlns:p14="http://schemas.microsoft.com/office/powerpoint/2010/main" val="1261707933"/>
+      </p:ext>
+    </p:extLst>
+  </p:cSld>
+  <p:clrMapOvr>
+    <a:masterClrMapping/>
+  </p:clrMapOvr>
+</p:sld>
+</file>
+
+<file path=ppt/slides/slide7.xml><?xml version="1.0" encoding="utf-8"?>
+<p:sld xmlns:a="http://schemas.openxmlformats.org/drawingml/2006/main" xmlns:r="http://schemas.openxmlformats.org/officeDocument/2006/relationships" xmlns:p="http://schemas.openxmlformats.org/presentationml/2006/main">
+  <p:cSld>
+    <p:spTree>
+      <p:nvGrpSpPr>
+        <p:cNvPr id="1" name=""/>
+        <p:cNvGrpSpPr/>
+        <p:nvPr/>
+      </p:nvGrpSpPr>
+      <p:grpSpPr>
+        <a:xfrm>
+          <a:off x="0" y="0"/>
+          <a:ext cx="0" cy="0"/>
+          <a:chOff x="0" y="0"/>
+          <a:chExt cx="0" cy="0"/>
+        </a:xfrm>
+      </p:grpSpPr>
+      <p:sp>
+        <p:nvSpPr>
+          <p:cNvPr id="4" name="文字方塊 3">
+            <a:extLst>
+              <a:ext uri="{FF2B5EF4-FFF2-40B4-BE49-F238E27FC236}">
+                <a16:creationId xmlns:a16="http://schemas.microsoft.com/office/drawing/2014/main" id="{93D12AED-2C14-45EA-A884-3419BCAA9A5D}"/>
+              </a:ext>
+            </a:extLst>
+          </p:cNvPr>
+          <p:cNvSpPr txBox="1"/>
+          <p:nvPr/>
+        </p:nvSpPr>
+        <p:spPr>
+          <a:xfrm>
+            <a:off x="284480" y="365760"/>
+            <a:ext cx="11673580" cy="1200329"/>
+          </a:xfrm>
+          <a:prstGeom prst="rect">
+            <a:avLst/>
+          </a:prstGeom>
+          <a:noFill/>
+        </p:spPr>
+        <p:txBody>
+          <a:bodyPr wrap="none" rtlCol="0">
+            <a:spAutoFit/>
+          </a:bodyPr>
+          <a:lstStyle/>
+          <a:p>
+            <a:r>
+              <a:rPr lang="en-US" altLang="zh-TW" b="1" u="sng" dirty="0" err="1"/>
+              <a:t>IdentityHashMap</a:t>
+            </a:r>
+            <a:endParaRPr lang="en-US" altLang="zh-TW" b="1" u="sng" dirty="0"/>
+          </a:p>
+          <a:p>
+            <a:endParaRPr lang="en-US" altLang="zh-TW" dirty="0"/>
+          </a:p>
+          <a:p>
+            <a:r>
+              <a:rPr lang="en-US" altLang="zh-TW" dirty="0"/>
+              <a:t>	</a:t>
+            </a:r>
+            <a:r>
+              <a:rPr lang="zh-CN" altLang="en-US" dirty="0"/>
+              <a:t>在</a:t>
+            </a:r>
+            <a:r>
+              <a:rPr lang="en-US" altLang="zh-CN" dirty="0" err="1"/>
+              <a:t>IdentityHashMap</a:t>
+            </a:r>
+            <a:r>
+              <a:rPr lang="zh-CN" altLang="en-US" dirty="0"/>
+              <a:t>中，当且仅当两个</a:t>
+            </a:r>
+            <a:r>
+              <a:rPr lang="en-US" altLang="zh-CN" dirty="0"/>
+              <a:t>key</a:t>
+            </a:r>
+            <a:r>
+              <a:rPr lang="zh-CN" altLang="en-US" dirty="0"/>
+              <a:t>严格相</a:t>
+            </a:r>
+            <a:r>
+              <a:rPr lang="zh-TW" altLang="en-US" dirty="0"/>
+              <a:t>等（</a:t>
+            </a:r>
+            <a:r>
+              <a:rPr lang="en-US" altLang="zh-TW" dirty="0"/>
+              <a:t>key1==key2</a:t>
+            </a:r>
+            <a:r>
+              <a:rPr lang="zh-TW" altLang="en-US" dirty="0"/>
+              <a:t>）时，</a:t>
+            </a:r>
+            <a:r>
+              <a:rPr lang="en-US" altLang="zh-TW" dirty="0" err="1"/>
+              <a:t>IdentityHashMap</a:t>
+            </a:r>
+            <a:r>
+              <a:rPr lang="zh-TW" altLang="en-US" dirty="0"/>
+              <a:t>才认为两个</a:t>
+            </a:r>
+            <a:r>
+              <a:rPr lang="en-US" altLang="zh-TW" dirty="0"/>
+              <a:t>key</a:t>
+            </a:r>
+            <a:r>
+              <a:rPr lang="zh-TW" altLang="en-US" dirty="0"/>
+              <a:t>相等</a:t>
+            </a:r>
+            <a:r>
+              <a:rPr lang="en-US" altLang="zh-TW" dirty="0"/>
+              <a:t>.</a:t>
+            </a:r>
+          </a:p>
+          <a:p>
+            <a:r>
+              <a:rPr lang="en-US" altLang="zh-TW" dirty="0"/>
+              <a:t>	</a:t>
+            </a:r>
+            <a:r>
+              <a:rPr lang="zh-CN" altLang="en-US" dirty="0"/>
+              <a:t>當</a:t>
+            </a:r>
+            <a:r>
+              <a:rPr lang="en-US" altLang="zh-CN" dirty="0"/>
+              <a:t>key</a:t>
+            </a:r>
+            <a:r>
+              <a:rPr lang="zh-CN" altLang="en-US" dirty="0"/>
+              <a:t>相等之後</a:t>
+            </a:r>
+            <a:r>
+              <a:rPr lang="en-US" altLang="zh-CN" dirty="0"/>
+              <a:t>,  </a:t>
+            </a:r>
+            <a:r>
+              <a:rPr lang="zh-CN" altLang="en-US"/>
+              <a:t>後面加入的值會覆蓋前面一個</a:t>
+            </a:r>
+            <a:endParaRPr lang="en-US" altLang="zh-TW" dirty="0"/>
+          </a:p>
+        </p:txBody>
+      </p:sp>
+    </p:spTree>
+    <p:extLst>
+      <p:ext uri="{BB962C8B-B14F-4D97-AF65-F5344CB8AC3E}">
+        <p14:creationId xmlns:p14="http://schemas.microsoft.com/office/powerpoint/2010/main" val="2089823545"/>
       </p:ext>
     </p:extLst>
   </p:cSld>

</xml_diff>

<commit_message>
Add the hash content into pptx
</commit_message>
<xml_diff>
--- a/JavaStudy/JavaStudyNote/Collection-Map/Java_Map.pptx
+++ b/JavaStudy/JavaStudyNote/Collection-Map/Java_Map.pptx
@@ -12,6 +12,9 @@
     <p:sldId id="260" r:id="rId6"/>
     <p:sldId id="261" r:id="rId7"/>
     <p:sldId id="262" r:id="rId8"/>
+    <p:sldId id="263" r:id="rId9"/>
+    <p:sldId id="264" r:id="rId10"/>
+    <p:sldId id="265" r:id="rId11"/>
   </p:sldIdLst>
   <p:sldSz cx="12192000" cy="6858000"/>
   <p:notesSz cx="6858000" cy="9144000"/>
@@ -3374,6 +3377,463 @@
 </p:sld>
 </file>
 
+<file path=ppt/slides/slide10.xml><?xml version="1.0" encoding="utf-8"?>
+<p:sld xmlns:a="http://schemas.openxmlformats.org/drawingml/2006/main" xmlns:r="http://schemas.openxmlformats.org/officeDocument/2006/relationships" xmlns:p="http://schemas.openxmlformats.org/presentationml/2006/main">
+  <p:cSld>
+    <p:spTree>
+      <p:nvGrpSpPr>
+        <p:cNvPr id="1" name=""/>
+        <p:cNvGrpSpPr/>
+        <p:nvPr/>
+      </p:nvGrpSpPr>
+      <p:grpSpPr>
+        <a:xfrm>
+          <a:off x="0" y="0"/>
+          <a:ext cx="0" cy="0"/>
+          <a:chOff x="0" y="0"/>
+          <a:chExt cx="0" cy="0"/>
+        </a:xfrm>
+      </p:grpSpPr>
+      <p:sp>
+        <p:nvSpPr>
+          <p:cNvPr id="4" name="文字方塊 3">
+            <a:extLst>
+              <a:ext uri="{FF2B5EF4-FFF2-40B4-BE49-F238E27FC236}">
+                <a16:creationId xmlns:a16="http://schemas.microsoft.com/office/drawing/2014/main" id="{5B13BE8F-7F4A-4531-B55A-8ACAEE69F03B}"/>
+              </a:ext>
+            </a:extLst>
+          </p:cNvPr>
+          <p:cNvSpPr txBox="1"/>
+          <p:nvPr/>
+        </p:nvSpPr>
+        <p:spPr>
+          <a:xfrm>
+            <a:off x="355600" y="335280"/>
+            <a:ext cx="11480800" cy="5355312"/>
+          </a:xfrm>
+          <a:prstGeom prst="rect">
+            <a:avLst/>
+          </a:prstGeom>
+          <a:noFill/>
+        </p:spPr>
+        <p:txBody>
+          <a:bodyPr wrap="square" rtlCol="0">
+            <a:spAutoFit/>
+          </a:bodyPr>
+          <a:lstStyle/>
+          <a:p>
+            <a:r>
+              <a:rPr lang="en-US" altLang="zh-CN" b="1" u="sng" dirty="0"/>
+              <a:t>Hash</a:t>
+            </a:r>
+            <a:r>
+              <a:rPr lang="zh-CN" altLang="en-US" b="1" u="sng" dirty="0"/>
+              <a:t>的集合性能選項</a:t>
+            </a:r>
+            <a:endParaRPr lang="en-US" altLang="zh-CN" b="1" u="sng" dirty="0"/>
+          </a:p>
+          <a:p>
+            <a:endParaRPr lang="en-US" altLang="zh-TW" dirty="0"/>
+          </a:p>
+          <a:p>
+            <a:r>
+              <a:rPr lang="en-US" altLang="zh-TW" dirty="0"/>
+              <a:t>	</a:t>
+            </a:r>
+            <a:r>
+              <a:rPr lang="en-US" altLang="zh-CN" dirty="0"/>
+              <a:t>hash</a:t>
+            </a:r>
+            <a:r>
+              <a:rPr lang="zh-CN" altLang="en-US" dirty="0"/>
+              <a:t>表里可以存储元素的位置被称为“桶（</a:t>
+            </a:r>
+            <a:r>
+              <a:rPr lang="en-US" altLang="zh-CN" dirty="0"/>
+              <a:t>bucket</a:t>
+            </a:r>
+            <a:r>
+              <a:rPr lang="zh-CN" altLang="en-US" dirty="0"/>
+              <a:t>）”，在通常情况下，单个“桶”里存储一个元素，此时有 </a:t>
+            </a:r>
+            <a:endParaRPr lang="en-US" altLang="zh-CN" dirty="0"/>
+          </a:p>
+          <a:p>
+            <a:r>
+              <a:rPr lang="en-US" altLang="zh-CN" dirty="0"/>
+              <a:t>                 </a:t>
+            </a:r>
+            <a:r>
+              <a:rPr lang="zh-CN" altLang="en-US" dirty="0"/>
+              <a:t>最好的性能：</a:t>
+            </a:r>
+            <a:r>
+              <a:rPr lang="en-US" altLang="zh-CN" dirty="0"/>
+              <a:t>hash</a:t>
+            </a:r>
+            <a:r>
+              <a:rPr lang="zh-CN" altLang="en-US" dirty="0"/>
+              <a:t>算法可以根据</a:t>
+            </a:r>
+            <a:r>
+              <a:rPr lang="en-US" altLang="zh-CN" dirty="0" err="1"/>
+              <a:t>hashCode</a:t>
+            </a:r>
+            <a:r>
+              <a:rPr lang="zh-CN" altLang="en-US" dirty="0"/>
+              <a:t>值计算出“桶”的存储位置，接着从“桶”中取出元素。但</a:t>
+            </a:r>
+            <a:r>
+              <a:rPr lang="en-US" altLang="zh-CN" dirty="0"/>
+              <a:t>hash</a:t>
+            </a:r>
+            <a:r>
+              <a:rPr lang="zh-CN" altLang="en-US" dirty="0"/>
+              <a:t>表的 </a:t>
+            </a:r>
+            <a:endParaRPr lang="en-US" altLang="zh-CN" dirty="0"/>
+          </a:p>
+          <a:p>
+            <a:r>
+              <a:rPr lang="en-US" altLang="zh-CN" dirty="0"/>
+              <a:t>                 </a:t>
+            </a:r>
+            <a:r>
+              <a:rPr lang="zh-CN" altLang="en-US" dirty="0"/>
+              <a:t>状态是</a:t>
+            </a:r>
+            <a:r>
+              <a:rPr lang="en-US" altLang="zh-CN" dirty="0"/>
+              <a:t>open</a:t>
+            </a:r>
+            <a:r>
+              <a:rPr lang="zh-CN" altLang="en-US" dirty="0"/>
+              <a:t>的：在发生“</a:t>
+            </a:r>
+            <a:r>
+              <a:rPr lang="en-US" altLang="zh-CN" dirty="0"/>
+              <a:t>hash</a:t>
+            </a:r>
+            <a:r>
+              <a:rPr lang="zh-CN" altLang="en-US" dirty="0"/>
+              <a:t>冲突”的情况下，单个桶会存储多个元素，这些元素以链表形式存储，必  </a:t>
+            </a:r>
+            <a:endParaRPr lang="en-US" altLang="zh-CN" dirty="0"/>
+          </a:p>
+          <a:p>
+            <a:r>
+              <a:rPr lang="en-US" altLang="zh-CN" dirty="0"/>
+              <a:t>                 </a:t>
+            </a:r>
+            <a:r>
+              <a:rPr lang="zh-CN" altLang="en-US" dirty="0"/>
+              <a:t>须按顺序搜索</a:t>
+            </a:r>
+            <a:r>
+              <a:rPr lang="en-US" altLang="zh-CN" dirty="0"/>
+              <a:t>, </a:t>
+            </a:r>
+            <a:r>
+              <a:rPr lang="zh-CN" altLang="en-US" dirty="0"/>
+              <a:t>此時效率降低了</a:t>
+            </a:r>
+            <a:r>
+              <a:rPr lang="en-US" altLang="zh-CN" dirty="0"/>
+              <a:t>.</a:t>
+            </a:r>
+          </a:p>
+          <a:p>
+            <a:endParaRPr lang="en-US" altLang="zh-TW" dirty="0"/>
+          </a:p>
+          <a:p>
+            <a:r>
+              <a:rPr lang="en-US" altLang="zh-TW" dirty="0"/>
+              <a:t>	hash</a:t>
+            </a:r>
+            <a:r>
+              <a:rPr lang="zh-CN" altLang="en-US" dirty="0"/>
+              <a:t>表有如下屬性</a:t>
+            </a:r>
+            <a:r>
+              <a:rPr lang="en-US" altLang="zh-CN" dirty="0"/>
+              <a:t>:</a:t>
+            </a:r>
+            <a:endParaRPr lang="zh-CN" altLang="en-US" dirty="0"/>
+          </a:p>
+          <a:p>
+            <a:r>
+              <a:rPr lang="en-US" altLang="zh-TW" dirty="0"/>
+              <a:t>		</a:t>
+            </a:r>
+            <a:r>
+              <a:rPr lang="zh-TW" altLang="en-US" dirty="0"/>
+              <a:t>➢ 容量（</a:t>
+            </a:r>
+            <a:r>
+              <a:rPr lang="en-US" altLang="zh-TW" dirty="0"/>
+              <a:t>capacity</a:t>
+            </a:r>
+            <a:r>
+              <a:rPr lang="zh-TW" altLang="en-US" dirty="0"/>
+              <a:t>）：</a:t>
+            </a:r>
+            <a:r>
+              <a:rPr lang="en-US" altLang="zh-TW" dirty="0"/>
+              <a:t>hash</a:t>
+            </a:r>
+            <a:r>
+              <a:rPr lang="zh-TW" altLang="en-US" dirty="0"/>
+              <a:t>表中桶的数量。</a:t>
+            </a:r>
+          </a:p>
+          <a:p>
+            <a:r>
+              <a:rPr lang="en-US" altLang="zh-TW" dirty="0"/>
+              <a:t>		</a:t>
+            </a:r>
+            <a:r>
+              <a:rPr lang="zh-TW" altLang="en-US" dirty="0"/>
+              <a:t>➢ 初始化容量（</a:t>
+            </a:r>
+            <a:r>
+              <a:rPr lang="en-US" altLang="zh-TW" dirty="0"/>
+              <a:t>initial capacity</a:t>
+            </a:r>
+            <a:r>
+              <a:rPr lang="zh-TW" altLang="en-US" dirty="0"/>
+              <a:t>）：创建</a:t>
+            </a:r>
+            <a:r>
+              <a:rPr lang="en-US" altLang="zh-TW" dirty="0"/>
+              <a:t>hash</a:t>
+            </a:r>
+            <a:r>
+              <a:rPr lang="zh-TW" altLang="en-US" dirty="0"/>
+              <a:t>表时桶的数量。</a:t>
+            </a:r>
+            <a:r>
+              <a:rPr lang="en-US" altLang="zh-TW" dirty="0"/>
+              <a:t>HashMap</a:t>
+            </a:r>
+            <a:r>
+              <a:rPr lang="zh-TW" altLang="en-US" dirty="0"/>
+              <a:t>和</a:t>
+            </a:r>
+            <a:r>
+              <a:rPr lang="en-US" altLang="zh-TW" dirty="0"/>
+              <a:t>HashSet</a:t>
+            </a:r>
+            <a:r>
+              <a:rPr lang="zh-TW" altLang="en-US" dirty="0"/>
+              <a:t>都允许在构造器</a:t>
+            </a:r>
+            <a:endParaRPr lang="en-US" altLang="zh-TW" dirty="0"/>
+          </a:p>
+          <a:p>
+            <a:r>
+              <a:rPr lang="en-US" altLang="zh-TW" dirty="0"/>
+              <a:t>                                         </a:t>
+            </a:r>
+            <a:r>
+              <a:rPr lang="zh-TW" altLang="en-US" dirty="0"/>
+              <a:t>中指定初始化容量。</a:t>
+            </a:r>
+          </a:p>
+          <a:p>
+            <a:r>
+              <a:rPr lang="zh-CN" altLang="en-US" dirty="0"/>
+              <a:t>                                   ➢ 尺寸（</a:t>
+            </a:r>
+            <a:r>
+              <a:rPr lang="en-US" altLang="zh-CN" dirty="0"/>
+              <a:t>size</a:t>
+            </a:r>
+            <a:r>
+              <a:rPr lang="zh-CN" altLang="en-US" dirty="0"/>
+              <a:t>）：当前</a:t>
+            </a:r>
+            <a:r>
+              <a:rPr lang="en-US" altLang="zh-CN" dirty="0"/>
+              <a:t>hash</a:t>
+            </a:r>
+            <a:r>
+              <a:rPr lang="zh-CN" altLang="en-US" dirty="0"/>
+              <a:t>表中记录的数量。</a:t>
+            </a:r>
+          </a:p>
+          <a:p>
+            <a:r>
+              <a:rPr lang="zh-TW" altLang="en-US" dirty="0"/>
+              <a:t>                                   ➢ 负载因子（ </a:t>
+            </a:r>
+            <a:r>
+              <a:rPr lang="en-US" altLang="zh-TW" dirty="0"/>
+              <a:t>load factor </a:t>
+            </a:r>
+            <a:r>
+              <a:rPr lang="zh-TW" altLang="en-US" dirty="0"/>
+              <a:t>） ： 负载因子等于</a:t>
+            </a:r>
+            <a:r>
+              <a:rPr lang="en-US" altLang="zh-TW" dirty="0"/>
+              <a:t>“size/capacity”</a:t>
+            </a:r>
+            <a:r>
+              <a:rPr lang="zh-TW" altLang="en-US" dirty="0"/>
+              <a:t>。负载因子为</a:t>
+            </a:r>
+            <a:r>
+              <a:rPr lang="en-US" altLang="zh-TW" dirty="0"/>
+              <a:t>0</a:t>
+            </a:r>
+            <a:r>
+              <a:rPr lang="zh-TW" altLang="en-US" dirty="0"/>
+              <a:t>，表示空的</a:t>
+            </a:r>
+            <a:r>
+              <a:rPr lang="en-US" altLang="zh-TW" dirty="0"/>
+              <a:t>hash</a:t>
+            </a:r>
+            <a:r>
+              <a:rPr lang="zh-TW" altLang="en-US" dirty="0"/>
+              <a:t>表，</a:t>
+            </a:r>
+            <a:endParaRPr lang="en-US" altLang="zh-TW" dirty="0"/>
+          </a:p>
+          <a:p>
+            <a:r>
+              <a:rPr lang="en-US" altLang="zh-TW" dirty="0"/>
+              <a:t>                                                                                               0.5</a:t>
+            </a:r>
+            <a:r>
+              <a:rPr lang="zh-TW" altLang="en-US" dirty="0"/>
+              <a:t>表示</a:t>
+            </a:r>
+            <a:r>
+              <a:rPr lang="zh-CN" altLang="en-US" dirty="0"/>
+              <a:t>半满的</a:t>
+            </a:r>
+            <a:r>
+              <a:rPr lang="en-US" altLang="zh-CN" dirty="0"/>
+              <a:t>hash</a:t>
+            </a:r>
+            <a:r>
+              <a:rPr lang="zh-CN" altLang="en-US" dirty="0"/>
+              <a:t>表，依此类推。轻负载的</a:t>
+            </a:r>
+            <a:r>
+              <a:rPr lang="en-US" altLang="zh-CN" dirty="0"/>
+              <a:t>hash</a:t>
+            </a:r>
+            <a:r>
+              <a:rPr lang="zh-CN" altLang="en-US" dirty="0"/>
+              <a:t>表具有冲突少、</a:t>
+            </a:r>
+            <a:endParaRPr lang="en-US" altLang="zh-CN" dirty="0"/>
+          </a:p>
+          <a:p>
+            <a:r>
+              <a:rPr lang="en-US" altLang="zh-CN" dirty="0"/>
+              <a:t>                                                                                               </a:t>
+            </a:r>
+            <a:r>
+              <a:rPr lang="zh-CN" altLang="en-US" dirty="0"/>
+              <a:t>适宜插入与查询的特点（但是使用</a:t>
+            </a:r>
+            <a:r>
+              <a:rPr lang="en-US" altLang="zh-CN" dirty="0"/>
+              <a:t>Iterator</a:t>
+            </a:r>
+            <a:r>
+              <a:rPr lang="zh-CN" altLang="en-US" dirty="0"/>
+              <a:t>迭代元素时比较慢）。</a:t>
+            </a:r>
+            <a:endParaRPr lang="en-US" altLang="zh-TW" dirty="0"/>
+          </a:p>
+          <a:p>
+            <a:r>
+              <a:rPr lang="en-US" altLang="zh-TW" dirty="0"/>
+              <a:t>	</a:t>
+            </a:r>
+          </a:p>
+          <a:p>
+            <a:pPr lvl="2"/>
+            <a:r>
+              <a:rPr lang="en-US" altLang="zh-CN" dirty="0"/>
+              <a:t>hash</a:t>
+            </a:r>
+            <a:r>
+              <a:rPr lang="zh-CN" altLang="en-US" dirty="0"/>
+              <a:t>表里还有一个“负载极限”，“负载极限”是一个</a:t>
+            </a:r>
+            <a:r>
+              <a:rPr lang="en-US" altLang="zh-CN" dirty="0"/>
+              <a:t>0</a:t>
+            </a:r>
+            <a:r>
+              <a:rPr lang="zh-CN" altLang="en-US" dirty="0"/>
+              <a:t>～</a:t>
+            </a:r>
+            <a:r>
+              <a:rPr lang="en-US" altLang="zh-CN" dirty="0"/>
+              <a:t>1</a:t>
+            </a:r>
+            <a:r>
+              <a:rPr lang="zh-CN" altLang="en-US" dirty="0"/>
+              <a:t>的数值，“负载极限”决定了</a:t>
+            </a:r>
+            <a:r>
+              <a:rPr lang="en-US" altLang="zh-CN" dirty="0"/>
+              <a:t>hash</a:t>
+            </a:r>
+            <a:r>
+              <a:rPr lang="zh-CN" altLang="en-US" dirty="0"/>
+              <a:t>表的最大填满程度。当</a:t>
+            </a:r>
+            <a:r>
+              <a:rPr lang="en-US" altLang="zh-CN" dirty="0"/>
+              <a:t>hash</a:t>
+            </a:r>
+            <a:r>
+              <a:rPr lang="zh-CN" altLang="en-US" dirty="0"/>
+              <a:t>表中的负载因子达到指定的“负载极限”时，</a:t>
+            </a:r>
+            <a:r>
+              <a:rPr lang="en-US" altLang="zh-CN" dirty="0"/>
+              <a:t>hash</a:t>
+            </a:r>
+            <a:r>
+              <a:rPr lang="zh-CN" altLang="en-US" dirty="0"/>
+              <a:t>表会自动成倍地增加容量（桶的数量），并将原有的对象重新分配，放入新的桶内，这</a:t>
+            </a:r>
+            <a:r>
+              <a:rPr lang="zh-TW" altLang="en-US" dirty="0"/>
+              <a:t>称为</a:t>
+            </a:r>
+            <a:r>
+              <a:rPr lang="en-US" altLang="zh-TW" dirty="0"/>
+              <a:t>rehashing</a:t>
+            </a:r>
+            <a:r>
+              <a:rPr lang="zh-TW" altLang="en-US" dirty="0"/>
+              <a:t>。</a:t>
+            </a:r>
+          </a:p>
+        </p:txBody>
+      </p:sp>
+    </p:spTree>
+    <p:extLst>
+      <p:ext uri="{BB962C8B-B14F-4D97-AF65-F5344CB8AC3E}">
+        <p14:creationId xmlns:p14="http://schemas.microsoft.com/office/powerpoint/2010/main" val="22556369"/>
+      </p:ext>
+    </p:extLst>
+  </p:cSld>
+  <p:clrMapOvr>
+    <a:masterClrMapping/>
+  </p:clrMapOvr>
+</p:sld>
+</file>
+
 <file path=ppt/slides/slide2.xml><?xml version="1.0" encoding="utf-8"?>
 <p:sld xmlns:a="http://schemas.openxmlformats.org/drawingml/2006/main" xmlns:r="http://schemas.openxmlformats.org/officeDocument/2006/relationships" xmlns:p="http://schemas.openxmlformats.org/presentationml/2006/main">
   <p:cSld>
@@ -4725,7 +5185,7 @@
               <a:t>,  </a:t>
             </a:r>
             <a:r>
-              <a:rPr lang="zh-CN" altLang="en-US"/>
+              <a:rPr lang="zh-CN" altLang="en-US" dirty="0"/>
               <a:t>後面加入的值會覆蓋前面一個</a:t>
             </a:r>
             <a:endParaRPr lang="en-US" altLang="zh-TW" dirty="0"/>
@@ -4736,6 +5196,687 @@
     <p:extLst>
       <p:ext uri="{BB962C8B-B14F-4D97-AF65-F5344CB8AC3E}">
         <p14:creationId xmlns:p14="http://schemas.microsoft.com/office/powerpoint/2010/main" val="2089823545"/>
+      </p:ext>
+    </p:extLst>
+  </p:cSld>
+  <p:clrMapOvr>
+    <a:masterClrMapping/>
+  </p:clrMapOvr>
+</p:sld>
+</file>
+
+<file path=ppt/slides/slide8.xml><?xml version="1.0" encoding="utf-8"?>
+<p:sld xmlns:a="http://schemas.openxmlformats.org/drawingml/2006/main" xmlns:r="http://schemas.openxmlformats.org/officeDocument/2006/relationships" xmlns:p="http://schemas.openxmlformats.org/presentationml/2006/main">
+  <p:cSld>
+    <p:spTree>
+      <p:nvGrpSpPr>
+        <p:cNvPr id="1" name=""/>
+        <p:cNvGrpSpPr/>
+        <p:nvPr/>
+      </p:nvGrpSpPr>
+      <p:grpSpPr>
+        <a:xfrm>
+          <a:off x="0" y="0"/>
+          <a:ext cx="0" cy="0"/>
+          <a:chOff x="0" y="0"/>
+          <a:chExt cx="0" cy="0"/>
+        </a:xfrm>
+      </p:grpSpPr>
+      <p:sp>
+        <p:nvSpPr>
+          <p:cNvPr id="4" name="文字方塊 3">
+            <a:extLst>
+              <a:ext uri="{FF2B5EF4-FFF2-40B4-BE49-F238E27FC236}">
+                <a16:creationId xmlns:a16="http://schemas.microsoft.com/office/drawing/2014/main" id="{5701DFEC-E2BF-4BFC-A8A5-FBF04FCD761F}"/>
+              </a:ext>
+            </a:extLst>
+          </p:cNvPr>
+          <p:cNvSpPr txBox="1"/>
+          <p:nvPr/>
+        </p:nvSpPr>
+        <p:spPr>
+          <a:xfrm>
+            <a:off x="391160" y="325120"/>
+            <a:ext cx="11409680" cy="3139321"/>
+          </a:xfrm>
+          <a:prstGeom prst="rect">
+            <a:avLst/>
+          </a:prstGeom>
+          <a:noFill/>
+        </p:spPr>
+        <p:txBody>
+          <a:bodyPr wrap="square" rtlCol="0">
+            <a:spAutoFit/>
+          </a:bodyPr>
+          <a:lstStyle/>
+          <a:p>
+            <a:r>
+              <a:rPr lang="en-US" altLang="zh-TW" b="1" u="sng" dirty="0" err="1"/>
+              <a:t>EnumMap</a:t>
+            </a:r>
+            <a:endParaRPr lang="en-US" altLang="zh-TW" b="1" u="sng" dirty="0"/>
+          </a:p>
+          <a:p>
+            <a:endParaRPr lang="en-US" altLang="zh-TW" dirty="0"/>
+          </a:p>
+          <a:p>
+            <a:r>
+              <a:rPr lang="en-US" altLang="zh-TW" dirty="0"/>
+              <a:t>	</a:t>
+            </a:r>
+            <a:r>
+              <a:rPr lang="en-US" altLang="zh-CN" dirty="0" err="1"/>
+              <a:t>EnumMap</a:t>
+            </a:r>
+            <a:r>
+              <a:rPr lang="zh-CN" altLang="en-US" dirty="0"/>
+              <a:t>是一个与枚举类一起使用的</a:t>
+            </a:r>
+            <a:r>
+              <a:rPr lang="en-US" altLang="zh-CN" dirty="0"/>
+              <a:t>Map</a:t>
+            </a:r>
+            <a:r>
+              <a:rPr lang="zh-CN" altLang="en-US" dirty="0"/>
+              <a:t>实现，</a:t>
+            </a:r>
+            <a:r>
+              <a:rPr lang="en-US" altLang="zh-CN" dirty="0" err="1"/>
+              <a:t>EnumMap</a:t>
+            </a:r>
+            <a:r>
+              <a:rPr lang="zh-CN" altLang="en-US" dirty="0"/>
+              <a:t>中的所有</a:t>
+            </a:r>
+            <a:r>
+              <a:rPr lang="en-US" altLang="zh-CN" dirty="0"/>
+              <a:t>key</a:t>
+            </a:r>
+            <a:r>
+              <a:rPr lang="zh-CN" altLang="en-US" dirty="0"/>
+              <a:t>都必须是单个枚举类的枚举值。</a:t>
+            </a:r>
+            <a:endParaRPr lang="en-US" altLang="zh-CN" dirty="0"/>
+          </a:p>
+          <a:p>
+            <a:r>
+              <a:rPr lang="en-US" altLang="zh-CN" dirty="0"/>
+              <a:t>                 </a:t>
+            </a:r>
+            <a:r>
+              <a:rPr lang="zh-CN" altLang="en-US" dirty="0"/>
+              <a:t>创建</a:t>
+            </a:r>
+            <a:r>
+              <a:rPr lang="en-US" altLang="zh-CN" dirty="0" err="1"/>
+              <a:t>EnumMap</a:t>
+            </a:r>
+            <a:r>
+              <a:rPr lang="zh-CN" altLang="en-US" dirty="0"/>
+              <a:t>时必须显式或隐式指定它对应的枚举类。</a:t>
+            </a:r>
+            <a:endParaRPr lang="en-US" altLang="zh-CN" dirty="0"/>
+          </a:p>
+          <a:p>
+            <a:endParaRPr lang="en-US" altLang="zh-TW" dirty="0"/>
+          </a:p>
+          <a:p>
+            <a:r>
+              <a:rPr lang="en-US" altLang="zh-TW" dirty="0"/>
+              <a:t>	(1)</a:t>
+            </a:r>
+            <a:r>
+              <a:rPr lang="en-US" altLang="zh-CN" dirty="0" err="1"/>
+              <a:t>EnumMap</a:t>
+            </a:r>
+            <a:r>
+              <a:rPr lang="zh-CN" altLang="en-US" dirty="0"/>
+              <a:t>在内部以数组形式保存，所以这种实现形式非常紧</a:t>
+            </a:r>
+            <a:r>
+              <a:rPr lang="zh-TW" altLang="en-US" dirty="0"/>
+              <a:t>凑、高效。</a:t>
+            </a:r>
+          </a:p>
+          <a:p>
+            <a:r>
+              <a:rPr lang="en-US" altLang="zh-CN" dirty="0"/>
+              <a:t>	(2)</a:t>
+            </a:r>
+            <a:r>
+              <a:rPr lang="en-US" altLang="zh-CN" dirty="0" err="1"/>
+              <a:t>EnumMap</a:t>
+            </a:r>
+            <a:r>
+              <a:rPr lang="zh-CN" altLang="en-US" dirty="0"/>
+              <a:t>根据</a:t>
+            </a:r>
+            <a:r>
+              <a:rPr lang="en-US" altLang="zh-CN" dirty="0"/>
+              <a:t>key</a:t>
+            </a:r>
+            <a:r>
+              <a:rPr lang="zh-CN" altLang="en-US" dirty="0"/>
+              <a:t>的自然顺序（即枚举值在枚举类中的定义顺序） 来维护</a:t>
+            </a:r>
+            <a:r>
+              <a:rPr lang="en-US" altLang="zh-CN" dirty="0"/>
+              <a:t>key-value </a:t>
+            </a:r>
+            <a:r>
+              <a:rPr lang="zh-CN" altLang="en-US" dirty="0"/>
+              <a:t>对的顺序。当程序</a:t>
+            </a:r>
+            <a:endParaRPr lang="en-US" altLang="zh-CN" dirty="0"/>
+          </a:p>
+          <a:p>
+            <a:r>
+              <a:rPr lang="en-US" altLang="zh-CN" dirty="0"/>
+              <a:t>                            </a:t>
+            </a:r>
+            <a:r>
+              <a:rPr lang="zh-CN" altLang="en-US" dirty="0"/>
+              <a:t>通过</a:t>
+            </a:r>
+            <a:r>
+              <a:rPr lang="en-US" altLang="zh-CN" dirty="0" err="1"/>
+              <a:t>keySet</a:t>
+            </a:r>
+            <a:r>
+              <a:rPr lang="en-US" altLang="zh-CN" dirty="0"/>
+              <a:t>() </a:t>
+            </a:r>
+            <a:r>
+              <a:rPr lang="zh-CN" altLang="en-US" dirty="0"/>
+              <a:t>、</a:t>
+            </a:r>
+            <a:r>
+              <a:rPr lang="en-US" altLang="zh-TW" dirty="0" err="1"/>
+              <a:t>entrySet</a:t>
+            </a:r>
+            <a:r>
+              <a:rPr lang="en-US" altLang="zh-TW" dirty="0"/>
+              <a:t>()</a:t>
+            </a:r>
+            <a:r>
+              <a:rPr lang="zh-TW" altLang="en-US" dirty="0"/>
+              <a:t>、</a:t>
+            </a:r>
+            <a:r>
+              <a:rPr lang="en-US" altLang="zh-TW" dirty="0"/>
+              <a:t>values()</a:t>
+            </a:r>
+            <a:r>
+              <a:rPr lang="zh-TW" altLang="en-US" dirty="0"/>
+              <a:t>等方法遍历</a:t>
+            </a:r>
+            <a:r>
+              <a:rPr lang="en-US" altLang="zh-TW" dirty="0" err="1"/>
+              <a:t>EnumMap</a:t>
+            </a:r>
+            <a:r>
+              <a:rPr lang="zh-TW" altLang="en-US" dirty="0"/>
+              <a:t>时可以看到这种顺序。</a:t>
+            </a:r>
+          </a:p>
+          <a:p>
+            <a:r>
+              <a:rPr lang="en-US" altLang="zh-CN" dirty="0"/>
+              <a:t>                  (3)</a:t>
+            </a:r>
+            <a:r>
+              <a:rPr lang="en-US" altLang="zh-CN" dirty="0" err="1"/>
+              <a:t>EnumMap</a:t>
+            </a:r>
+            <a:r>
+              <a:rPr lang="en-US" altLang="zh-CN" dirty="0"/>
+              <a:t> </a:t>
+            </a:r>
+            <a:r>
+              <a:rPr lang="zh-CN" altLang="en-US" dirty="0"/>
+              <a:t>不允许使用</a:t>
+            </a:r>
+            <a:r>
+              <a:rPr lang="en-US" altLang="zh-CN" dirty="0"/>
+              <a:t>null </a:t>
+            </a:r>
+            <a:r>
+              <a:rPr lang="zh-CN" altLang="en-US" dirty="0"/>
+              <a:t>作为</a:t>
+            </a:r>
+            <a:r>
+              <a:rPr lang="en-US" altLang="zh-CN" dirty="0"/>
+              <a:t>key </a:t>
+            </a:r>
+            <a:r>
+              <a:rPr lang="zh-CN" altLang="en-US" dirty="0"/>
+              <a:t>， 但允许使用</a:t>
+            </a:r>
+            <a:r>
+              <a:rPr lang="en-US" altLang="zh-CN" dirty="0"/>
+              <a:t>null </a:t>
+            </a:r>
+            <a:r>
+              <a:rPr lang="zh-CN" altLang="en-US" dirty="0"/>
+              <a:t>作为</a:t>
+            </a:r>
+            <a:r>
+              <a:rPr lang="en-US" altLang="zh-CN" dirty="0"/>
+              <a:t>value </a:t>
+            </a:r>
+            <a:r>
+              <a:rPr lang="zh-CN" altLang="en-US" dirty="0"/>
+              <a:t>。如果试图使用</a:t>
+            </a:r>
+            <a:r>
+              <a:rPr lang="en-US" altLang="zh-CN" dirty="0"/>
+              <a:t>null </a:t>
+            </a:r>
+            <a:r>
+              <a:rPr lang="zh-CN" altLang="en-US" dirty="0"/>
+              <a:t>作为</a:t>
+            </a:r>
+            <a:r>
+              <a:rPr lang="en-US" altLang="zh-CN" dirty="0"/>
+              <a:t>key </a:t>
+            </a:r>
+            <a:r>
+              <a:rPr lang="zh-CN" altLang="en-US" dirty="0"/>
+              <a:t>时将抛出</a:t>
+            </a:r>
+          </a:p>
+          <a:p>
+            <a:r>
+              <a:rPr lang="en-US" altLang="zh-TW" dirty="0"/>
+              <a:t>                      </a:t>
+            </a:r>
+            <a:r>
+              <a:rPr lang="en-US" altLang="zh-TW" dirty="0" err="1"/>
+              <a:t>NullPointerException</a:t>
+            </a:r>
+            <a:r>
+              <a:rPr lang="zh-TW" altLang="en-US" dirty="0"/>
+              <a:t>异常。如果只是查询是否包含值为</a:t>
+            </a:r>
+            <a:r>
+              <a:rPr lang="en-US" altLang="zh-TW" dirty="0"/>
+              <a:t>null</a:t>
+            </a:r>
+            <a:r>
+              <a:rPr lang="zh-CN" altLang="en-US" dirty="0"/>
+              <a:t>的</a:t>
+            </a:r>
+            <a:r>
+              <a:rPr lang="en-US" altLang="zh-CN" dirty="0"/>
+              <a:t>key</a:t>
+            </a:r>
+            <a:r>
+              <a:rPr lang="zh-CN" altLang="en-US" dirty="0"/>
+              <a:t>，或只是删除值为</a:t>
+            </a:r>
+            <a:r>
+              <a:rPr lang="en-US" altLang="zh-CN" dirty="0"/>
+              <a:t>null</a:t>
+            </a:r>
+            <a:r>
+              <a:rPr lang="zh-CN" altLang="en-US" dirty="0"/>
+              <a:t>的</a:t>
+            </a:r>
+            <a:r>
+              <a:rPr lang="en-US" altLang="zh-CN" dirty="0"/>
+              <a:t>key</a:t>
+            </a:r>
+            <a:r>
+              <a:rPr lang="zh-CN" altLang="en-US" dirty="0"/>
+              <a:t>，都不会</a:t>
+            </a:r>
+            <a:endParaRPr lang="en-US" altLang="zh-CN" dirty="0"/>
+          </a:p>
+          <a:p>
+            <a:r>
+              <a:rPr lang="en-US" altLang="zh-CN"/>
+              <a:t>                      </a:t>
+            </a:r>
+            <a:r>
+              <a:rPr lang="zh-CN" altLang="en-US"/>
+              <a:t>抛</a:t>
+            </a:r>
+            <a:r>
+              <a:rPr lang="zh-CN" altLang="en-US" dirty="0"/>
+              <a:t>出异常。</a:t>
+            </a:r>
+            <a:endParaRPr lang="zh-TW" altLang="en-US" dirty="0"/>
+          </a:p>
+        </p:txBody>
+      </p:sp>
+    </p:spTree>
+    <p:extLst>
+      <p:ext uri="{BB962C8B-B14F-4D97-AF65-F5344CB8AC3E}">
+        <p14:creationId xmlns:p14="http://schemas.microsoft.com/office/powerpoint/2010/main" val="1776609091"/>
+      </p:ext>
+    </p:extLst>
+  </p:cSld>
+  <p:clrMapOvr>
+    <a:masterClrMapping/>
+  </p:clrMapOvr>
+</p:sld>
+</file>
+
+<file path=ppt/slides/slide9.xml><?xml version="1.0" encoding="utf-8"?>
+<p:sld xmlns:a="http://schemas.openxmlformats.org/drawingml/2006/main" xmlns:r="http://schemas.openxmlformats.org/officeDocument/2006/relationships" xmlns:p="http://schemas.openxmlformats.org/presentationml/2006/main">
+  <p:cSld>
+    <p:spTree>
+      <p:nvGrpSpPr>
+        <p:cNvPr id="1" name=""/>
+        <p:cNvGrpSpPr/>
+        <p:nvPr/>
+      </p:nvGrpSpPr>
+      <p:grpSpPr>
+        <a:xfrm>
+          <a:off x="0" y="0"/>
+          <a:ext cx="0" cy="0"/>
+          <a:chOff x="0" y="0"/>
+          <a:chExt cx="0" cy="0"/>
+        </a:xfrm>
+      </p:grpSpPr>
+      <p:sp>
+        <p:nvSpPr>
+          <p:cNvPr id="4" name="文字方塊 3">
+            <a:extLst>
+              <a:ext uri="{FF2B5EF4-FFF2-40B4-BE49-F238E27FC236}">
+                <a16:creationId xmlns:a16="http://schemas.microsoft.com/office/drawing/2014/main" id="{2FAF8E32-FDC6-4966-9CC1-CB564A0D8384}"/>
+              </a:ext>
+            </a:extLst>
+          </p:cNvPr>
+          <p:cNvSpPr txBox="1"/>
+          <p:nvPr/>
+        </p:nvSpPr>
+        <p:spPr>
+          <a:xfrm>
+            <a:off x="193040" y="254000"/>
+            <a:ext cx="11724640" cy="2862322"/>
+          </a:xfrm>
+          <a:prstGeom prst="rect">
+            <a:avLst/>
+          </a:prstGeom>
+          <a:noFill/>
+        </p:spPr>
+        <p:txBody>
+          <a:bodyPr wrap="square" rtlCol="0">
+            <a:spAutoFit/>
+          </a:bodyPr>
+          <a:lstStyle/>
+          <a:p>
+            <a:r>
+              <a:rPr lang="zh-CN" altLang="en-US" b="1" u="sng" dirty="0"/>
+              <a:t>各</a:t>
+            </a:r>
+            <a:r>
+              <a:rPr lang="en-US" altLang="zh-CN" b="1" u="sng" dirty="0"/>
+              <a:t>map</a:t>
+            </a:r>
+            <a:r>
+              <a:rPr lang="zh-CN" altLang="en-US" b="1" u="sng" dirty="0"/>
+              <a:t>集合的性能分析</a:t>
+            </a:r>
+            <a:endParaRPr lang="en-US" altLang="zh-CN" b="1" u="sng" dirty="0"/>
+          </a:p>
+          <a:p>
+            <a:endParaRPr lang="en-US" altLang="zh-TW" dirty="0"/>
+          </a:p>
+          <a:p>
+            <a:endParaRPr lang="en-US" altLang="zh-TW" dirty="0"/>
+          </a:p>
+          <a:p>
+            <a:r>
+              <a:rPr lang="en-US" altLang="zh-TW" dirty="0"/>
+              <a:t>	1.Hashtable</a:t>
+            </a:r>
+            <a:r>
+              <a:rPr lang="zh-TW" altLang="en-US" dirty="0"/>
+              <a:t>是一个古老的、线程安全的集合，因此</a:t>
+            </a:r>
+            <a:r>
+              <a:rPr lang="en-US" altLang="zh-TW" dirty="0"/>
+              <a:t>HashMap</a:t>
+            </a:r>
+            <a:r>
+              <a:rPr lang="zh-TW" altLang="en-US" dirty="0"/>
+              <a:t>通常比</a:t>
+            </a:r>
+            <a:r>
+              <a:rPr lang="en-US" altLang="zh-TW" dirty="0" err="1"/>
+              <a:t>Hashtable</a:t>
+            </a:r>
+            <a:r>
+              <a:rPr lang="zh-TW" altLang="en-US" dirty="0"/>
+              <a:t>要快。</a:t>
+            </a:r>
+            <a:endParaRPr lang="en-US" altLang="zh-TW" dirty="0"/>
+          </a:p>
+          <a:p>
+            <a:r>
+              <a:rPr lang="en-US" altLang="zh-TW" dirty="0"/>
+              <a:t>	2. </a:t>
+            </a:r>
+            <a:r>
+              <a:rPr lang="en-US" altLang="zh-TW" dirty="0" err="1"/>
+              <a:t>TreeMap</a:t>
+            </a:r>
+            <a:r>
+              <a:rPr lang="zh-TW" altLang="en-US" dirty="0"/>
+              <a:t>通常比</a:t>
+            </a:r>
+            <a:r>
+              <a:rPr lang="en-US" altLang="zh-TW" dirty="0"/>
+              <a:t>HashMap</a:t>
+            </a:r>
+            <a:r>
+              <a:rPr lang="zh-TW" altLang="en-US" dirty="0"/>
+              <a:t>、</a:t>
+            </a:r>
+            <a:r>
+              <a:rPr lang="en-US" altLang="zh-TW" dirty="0" err="1"/>
+              <a:t>Hashtable</a:t>
+            </a:r>
+            <a:r>
+              <a:rPr lang="zh-TW" altLang="en-US" dirty="0"/>
+              <a:t>要慢（尤其在插入、删除</a:t>
+            </a:r>
+            <a:r>
+              <a:rPr lang="en-US" altLang="zh-TW" dirty="0" err="1"/>
+              <a:t>keyvalue</a:t>
+            </a:r>
+            <a:r>
+              <a:rPr lang="zh-CN" altLang="en-US" dirty="0"/>
+              <a:t>对时更慢），因为</a:t>
+            </a:r>
+            <a:r>
+              <a:rPr lang="en-US" altLang="zh-CN" dirty="0" err="1"/>
+              <a:t>TreeMap</a:t>
+            </a:r>
+            <a:r>
+              <a:rPr lang="zh-CN" altLang="en-US" dirty="0"/>
+              <a:t>底层采 </a:t>
+            </a:r>
+            <a:endParaRPr lang="en-US" altLang="zh-CN" dirty="0"/>
+          </a:p>
+          <a:p>
+            <a:r>
+              <a:rPr lang="en-US" altLang="zh-CN" dirty="0"/>
+              <a:t>                     </a:t>
+            </a:r>
+            <a:r>
+              <a:rPr lang="zh-CN" altLang="en-US" dirty="0"/>
+              <a:t>用红黑树来管理</a:t>
+            </a:r>
+            <a:r>
+              <a:rPr lang="en-US" altLang="zh-CN" dirty="0"/>
+              <a:t>key-value</a:t>
+            </a:r>
+            <a:r>
+              <a:rPr lang="zh-CN" altLang="en-US" dirty="0"/>
+              <a:t>对（红黑树的每个节点就是一个</a:t>
+            </a:r>
+            <a:r>
+              <a:rPr lang="en-US" altLang="zh-CN" dirty="0"/>
+              <a:t>key-value</a:t>
+            </a:r>
+            <a:r>
+              <a:rPr lang="zh-CN" altLang="en-US" dirty="0"/>
+              <a:t>对）。</a:t>
+            </a:r>
+            <a:r>
+              <a:rPr lang="zh-TW" altLang="en-US" dirty="0"/>
+              <a:t>使用</a:t>
+            </a:r>
+            <a:r>
+              <a:rPr lang="en-US" altLang="zh-TW" dirty="0" err="1"/>
+              <a:t>TreeMap</a:t>
+            </a:r>
+            <a:r>
+              <a:rPr lang="zh-TW" altLang="en-US" dirty="0"/>
+              <a:t>有一个好处</a:t>
+            </a:r>
+            <a:r>
+              <a:rPr lang="zh-CN" altLang="en-US" dirty="0"/>
+              <a:t>：</a:t>
+            </a:r>
+            <a:endParaRPr lang="en-US" altLang="zh-CN" dirty="0"/>
+          </a:p>
+          <a:p>
+            <a:r>
+              <a:rPr lang="en-US" altLang="zh-TW" dirty="0"/>
+              <a:t>                     :</a:t>
+            </a:r>
+            <a:r>
+              <a:rPr lang="en-US" altLang="zh-TW" dirty="0" err="1"/>
+              <a:t>TreeMap</a:t>
+            </a:r>
+            <a:r>
+              <a:rPr lang="zh-TW" altLang="en-US" dirty="0"/>
+              <a:t>中的</a:t>
+            </a:r>
+            <a:r>
+              <a:rPr lang="en-US" altLang="zh-TW" dirty="0"/>
+              <a:t>key-value</a:t>
+            </a:r>
+            <a:r>
+              <a:rPr lang="zh-TW" altLang="en-US" dirty="0"/>
+              <a:t>对总是处于有序</a:t>
+            </a:r>
+            <a:r>
+              <a:rPr lang="zh-CN" altLang="en-US" dirty="0"/>
+              <a:t>状态，无须专门进行排序操作。</a:t>
+            </a:r>
+            <a:endParaRPr lang="en-US" altLang="zh-CN" dirty="0"/>
+          </a:p>
+          <a:p>
+            <a:r>
+              <a:rPr lang="en-US" altLang="zh-TW" dirty="0"/>
+              <a:t>	3.</a:t>
+            </a:r>
+            <a:r>
+              <a:rPr lang="zh-CN" altLang="en-US" dirty="0"/>
+              <a:t>一般的应用场景， 程序应该多考虑使用</a:t>
+            </a:r>
+            <a:r>
+              <a:rPr lang="en-US" altLang="zh-CN" dirty="0"/>
+              <a:t>HashMap </a:t>
+            </a:r>
+            <a:r>
+              <a:rPr lang="zh-CN" altLang="en-US" dirty="0"/>
+              <a:t>， 因为</a:t>
+            </a:r>
+            <a:r>
+              <a:rPr lang="en-US" altLang="zh-CN" dirty="0"/>
+              <a:t>HashMap</a:t>
+            </a:r>
+            <a:r>
+              <a:rPr lang="zh-CN" altLang="en-US" dirty="0"/>
+              <a:t>正是为快速查询设计的（</a:t>
+            </a:r>
+            <a:r>
+              <a:rPr lang="en-US" altLang="zh-CN" dirty="0"/>
+              <a:t>HashMap</a:t>
+            </a:r>
+            <a:r>
+              <a:rPr lang="zh-CN" altLang="en-US" dirty="0"/>
+              <a:t>底层  </a:t>
+            </a:r>
+            <a:endParaRPr lang="en-US" altLang="zh-CN" dirty="0"/>
+          </a:p>
+          <a:p>
+            <a:r>
+              <a:rPr lang="en-US" altLang="zh-CN" dirty="0"/>
+              <a:t>                     </a:t>
+            </a:r>
+            <a:r>
+              <a:rPr lang="zh-CN" altLang="en-US" dirty="0"/>
+              <a:t>其实也是采用数组来存</a:t>
+            </a:r>
+            <a:r>
+              <a:rPr lang="zh-TW" altLang="en-US" dirty="0"/>
+              <a:t>储</a:t>
+            </a:r>
+            <a:r>
+              <a:rPr lang="en-US" altLang="zh-TW" dirty="0"/>
+              <a:t>key-value</a:t>
+            </a:r>
+            <a:r>
+              <a:rPr lang="zh-TW" altLang="en-US" dirty="0"/>
+              <a:t>对）。</a:t>
+            </a:r>
+            <a:endParaRPr lang="en-US" altLang="zh-TW" dirty="0"/>
+          </a:p>
+          <a:p>
+            <a:r>
+              <a:rPr lang="en-US" altLang="zh-TW" dirty="0"/>
+              <a:t>	4.</a:t>
+            </a:r>
+            <a:r>
+              <a:rPr lang="en-US" altLang="zh-CN" dirty="0"/>
+              <a:t> </a:t>
+            </a:r>
+            <a:r>
+              <a:rPr lang="en-US" altLang="zh-CN" dirty="0" err="1"/>
+              <a:t>LinkedHashMap</a:t>
+            </a:r>
+            <a:r>
+              <a:rPr lang="zh-CN" altLang="en-US" dirty="0"/>
+              <a:t>比</a:t>
+            </a:r>
+            <a:r>
+              <a:rPr lang="en-US" altLang="zh-CN" dirty="0"/>
+              <a:t>HashMap</a:t>
+            </a:r>
+            <a:r>
+              <a:rPr lang="zh-CN" altLang="en-US" dirty="0"/>
+              <a:t>慢一点，因为它需要维护链表来保持</a:t>
+            </a:r>
+            <a:r>
+              <a:rPr lang="en-US" altLang="zh-CN" dirty="0"/>
+              <a:t>Map</a:t>
+            </a:r>
+            <a:r>
+              <a:rPr lang="zh-TW" altLang="en-US" dirty="0"/>
+              <a:t>中</a:t>
+            </a:r>
+            <a:r>
+              <a:rPr lang="en-US" altLang="zh-TW" dirty="0"/>
+              <a:t>key-value</a:t>
+            </a:r>
+            <a:r>
+              <a:rPr lang="zh-TW" altLang="en-US" dirty="0"/>
+              <a:t>时的添加顺序。</a:t>
+            </a:r>
+          </a:p>
+        </p:txBody>
+      </p:sp>
+    </p:spTree>
+    <p:extLst>
+      <p:ext uri="{BB962C8B-B14F-4D97-AF65-F5344CB8AC3E}">
+        <p14:creationId xmlns:p14="http://schemas.microsoft.com/office/powerpoint/2010/main" val="3728959784"/>
       </p:ext>
     </p:extLst>
   </p:cSld>

</xml_diff>